<commit_message>
initial commit of markdown file
</commit_message>
<xml_diff>
--- a/OLD/PowerPresentation_2021-10-12.pptx
+++ b/OLD/PowerPresentation_2021-10-12.pptx
@@ -5,7 +5,7 @@
     <p:sldMasterId id="2147483648" r:id="rId1"/>
   </p:sldMasterIdLst>
   <p:notesMasterIdLst>
-    <p:notesMasterId r:id="rId20"/>
+    <p:notesMasterId r:id="rId21"/>
   </p:notesMasterIdLst>
   <p:sldIdLst>
     <p:sldId id="277" r:id="rId2"/>
@@ -13,19 +13,20 @@
     <p:sldId id="275" r:id="rId4"/>
     <p:sldId id="276" r:id="rId5"/>
     <p:sldId id="258" r:id="rId6"/>
-    <p:sldId id="261" r:id="rId7"/>
-    <p:sldId id="269" r:id="rId8"/>
-    <p:sldId id="266" r:id="rId9"/>
-    <p:sldId id="267" r:id="rId10"/>
-    <p:sldId id="272" r:id="rId11"/>
-    <p:sldId id="268" r:id="rId12"/>
-    <p:sldId id="271" r:id="rId13"/>
-    <p:sldId id="270" r:id="rId14"/>
-    <p:sldId id="274" r:id="rId15"/>
-    <p:sldId id="273" r:id="rId16"/>
-    <p:sldId id="260" r:id="rId17"/>
-    <p:sldId id="259" r:id="rId18"/>
-    <p:sldId id="264" r:id="rId19"/>
+    <p:sldId id="278" r:id="rId7"/>
+    <p:sldId id="261" r:id="rId8"/>
+    <p:sldId id="269" r:id="rId9"/>
+    <p:sldId id="266" r:id="rId10"/>
+    <p:sldId id="267" r:id="rId11"/>
+    <p:sldId id="272" r:id="rId12"/>
+    <p:sldId id="268" r:id="rId13"/>
+    <p:sldId id="271" r:id="rId14"/>
+    <p:sldId id="270" r:id="rId15"/>
+    <p:sldId id="274" r:id="rId16"/>
+    <p:sldId id="273" r:id="rId17"/>
+    <p:sldId id="260" r:id="rId18"/>
+    <p:sldId id="259" r:id="rId19"/>
+    <p:sldId id="264" r:id="rId20"/>
   </p:sldIdLst>
   <p:sldSz cx="12192000" cy="6858000"/>
   <p:notesSz cx="6858000" cy="9144000"/>
@@ -135,7 +136,7 @@
 <file path=ppt/revisionInfo.xml><?xml version="1.0" encoding="utf-8"?>
 <p1510:revInfo xmlns:a="http://schemas.openxmlformats.org/drawingml/2006/main" xmlns:r="http://schemas.openxmlformats.org/officeDocument/2006/relationships" xmlns:p1510="http://schemas.microsoft.com/office/powerpoint/2015/10/main">
   <p1510:revLst>
-    <p1510:client id="{7EBD6F4B-B58B-4897-AA11-538034D7784B}" v="7" dt="2021-09-29T18:38:01.991"/>
+    <p1510:client id="{7EBD6F4B-B58B-4897-AA11-538034D7784B}" v="8" dt="2021-10-01T18:09:03.191"/>
   </p1510:revLst>
 </p1510:revInfo>
 </file>
@@ -145,12 +146,12 @@
   <pc:docChgLst>
     <pc:chgData name="Matthews, Leslie" userId="de7ed39e-5fa3-4779-9e9a-8f804675cccd" providerId="ADAL" clId="{7EBD6F4B-B58B-4897-AA11-538034D7784B}"/>
     <pc:docChg chg="undo custSel addSld delSld modSld sldOrd">
-      <pc:chgData name="Matthews, Leslie" userId="de7ed39e-5fa3-4779-9e9a-8f804675cccd" providerId="ADAL" clId="{7EBD6F4B-B58B-4897-AA11-538034D7784B}" dt="2021-09-29T19:07:12.407" v="3143"/>
+      <pc:chgData name="Matthews, Leslie" userId="de7ed39e-5fa3-4779-9e9a-8f804675cccd" providerId="ADAL" clId="{7EBD6F4B-B58B-4897-AA11-538034D7784B}" dt="2021-10-01T18:10:16.892" v="3383" actId="1076"/>
       <pc:docMkLst>
         <pc:docMk/>
       </pc:docMkLst>
       <pc:sldChg chg="modSp mod ord modNotesTx">
-        <pc:chgData name="Matthews, Leslie" userId="de7ed39e-5fa3-4779-9e9a-8f804675cccd" providerId="ADAL" clId="{7EBD6F4B-B58B-4897-AA11-538034D7784B}" dt="2021-09-29T18:24:31.951" v="2953"/>
+        <pc:chgData name="Matthews, Leslie" userId="de7ed39e-5fa3-4779-9e9a-8f804675cccd" providerId="ADAL" clId="{7EBD6F4B-B58B-4897-AA11-538034D7784B}" dt="2021-10-01T18:06:26.676" v="3161" actId="20577"/>
         <pc:sldMkLst>
           <pc:docMk/>
           <pc:sldMk cId="845976710" sldId="256"/>
@@ -164,7 +165,7 @@
           </ac:spMkLst>
         </pc:spChg>
         <pc:spChg chg="mod">
-          <ac:chgData name="Matthews, Leslie" userId="de7ed39e-5fa3-4779-9e9a-8f804675cccd" providerId="ADAL" clId="{7EBD6F4B-B58B-4897-AA11-538034D7784B}" dt="2021-09-29T18:19:16.510" v="2678" actId="6549"/>
+          <ac:chgData name="Matthews, Leslie" userId="de7ed39e-5fa3-4779-9e9a-8f804675cccd" providerId="ADAL" clId="{7EBD6F4B-B58B-4897-AA11-538034D7784B}" dt="2021-10-01T18:06:26.676" v="3161" actId="20577"/>
           <ac:spMkLst>
             <pc:docMk/>
             <pc:sldMk cId="845976710" sldId="256"/>
@@ -315,6 +316,29 @@
           </ac:picMkLst>
         </pc:picChg>
       </pc:sldChg>
+      <pc:sldChg chg="addSp modSp new mod">
+        <pc:chgData name="Matthews, Leslie" userId="de7ed39e-5fa3-4779-9e9a-8f804675cccd" providerId="ADAL" clId="{7EBD6F4B-B58B-4897-AA11-538034D7784B}" dt="2021-10-01T18:10:16.892" v="3383" actId="1076"/>
+        <pc:sldMkLst>
+          <pc:docMk/>
+          <pc:sldMk cId="1742172774" sldId="278"/>
+        </pc:sldMkLst>
+        <pc:spChg chg="add mod">
+          <ac:chgData name="Matthews, Leslie" userId="de7ed39e-5fa3-4779-9e9a-8f804675cccd" providerId="ADAL" clId="{7EBD6F4B-B58B-4897-AA11-538034D7784B}" dt="2021-10-01T18:08:58.316" v="3165" actId="2085"/>
+          <ac:spMkLst>
+            <pc:docMk/>
+            <pc:sldMk cId="1742172774" sldId="278"/>
+            <ac:spMk id="2" creationId="{350E231E-FFBA-4710-B6D3-171560616F6E}"/>
+          </ac:spMkLst>
+        </pc:spChg>
+        <pc:spChg chg="add mod">
+          <ac:chgData name="Matthews, Leslie" userId="de7ed39e-5fa3-4779-9e9a-8f804675cccd" providerId="ADAL" clId="{7EBD6F4B-B58B-4897-AA11-538034D7784B}" dt="2021-10-01T18:10:16.892" v="3383" actId="1076"/>
+          <ac:spMkLst>
+            <pc:docMk/>
+            <pc:sldMk cId="1742172774" sldId="278"/>
+            <ac:spMk id="3" creationId="{BD2C85E6-524A-4C9C-BDCD-BCCFFC799AD3}"/>
+          </ac:spMkLst>
+        </pc:spChg>
+      </pc:sldChg>
     </pc:docChg>
   </pc:docChgLst>
 </pc:chgInfo>
@@ -402,7 +426,7 @@
           <a:p>
             <a:fld id="{7BCF0BEA-636B-4FAC-B17D-231E7E74B20F}" type="datetimeFigureOut">
               <a:rPr lang="en-US" smtClean="0"/>
-              <a:t>9/29/2021</a:t>
+              <a:t>10/1/2021</a:t>
             </a:fld>
             <a:endParaRPr lang="en-US"/>
           </a:p>
@@ -1182,7 +1206,7 @@
           <a:p>
             <a:fld id="{CC2D407D-9E44-4102-8064-F1AFBB4C770E}" type="datetimeFigureOut">
               <a:rPr lang="en-US" smtClean="0"/>
-              <a:t>9/29/2021</a:t>
+              <a:t>10/1/2021</a:t>
             </a:fld>
             <a:endParaRPr lang="en-US"/>
           </a:p>
@@ -1380,7 +1404,7 @@
           <a:p>
             <a:fld id="{CC2D407D-9E44-4102-8064-F1AFBB4C770E}" type="datetimeFigureOut">
               <a:rPr lang="en-US" smtClean="0"/>
-              <a:t>9/29/2021</a:t>
+              <a:t>10/1/2021</a:t>
             </a:fld>
             <a:endParaRPr lang="en-US"/>
           </a:p>
@@ -1588,7 +1612,7 @@
           <a:p>
             <a:fld id="{CC2D407D-9E44-4102-8064-F1AFBB4C770E}" type="datetimeFigureOut">
               <a:rPr lang="en-US" smtClean="0"/>
-              <a:t>9/29/2021</a:t>
+              <a:t>10/1/2021</a:t>
             </a:fld>
             <a:endParaRPr lang="en-US"/>
           </a:p>
@@ -1786,7 +1810,7 @@
           <a:p>
             <a:fld id="{CC2D407D-9E44-4102-8064-F1AFBB4C770E}" type="datetimeFigureOut">
               <a:rPr lang="en-US" smtClean="0"/>
-              <a:t>9/29/2021</a:t>
+              <a:t>10/1/2021</a:t>
             </a:fld>
             <a:endParaRPr lang="en-US"/>
           </a:p>
@@ -2061,7 +2085,7 @@
           <a:p>
             <a:fld id="{CC2D407D-9E44-4102-8064-F1AFBB4C770E}" type="datetimeFigureOut">
               <a:rPr lang="en-US" smtClean="0"/>
-              <a:t>9/29/2021</a:t>
+              <a:t>10/1/2021</a:t>
             </a:fld>
             <a:endParaRPr lang="en-US"/>
           </a:p>
@@ -2326,7 +2350,7 @@
           <a:p>
             <a:fld id="{CC2D407D-9E44-4102-8064-F1AFBB4C770E}" type="datetimeFigureOut">
               <a:rPr lang="en-US" smtClean="0"/>
-              <a:t>9/29/2021</a:t>
+              <a:t>10/1/2021</a:t>
             </a:fld>
             <a:endParaRPr lang="en-US"/>
           </a:p>
@@ -2738,7 +2762,7 @@
           <a:p>
             <a:fld id="{CC2D407D-9E44-4102-8064-F1AFBB4C770E}" type="datetimeFigureOut">
               <a:rPr lang="en-US" smtClean="0"/>
-              <a:t>9/29/2021</a:t>
+              <a:t>10/1/2021</a:t>
             </a:fld>
             <a:endParaRPr lang="en-US"/>
           </a:p>
@@ -2879,7 +2903,7 @@
           <a:p>
             <a:fld id="{CC2D407D-9E44-4102-8064-F1AFBB4C770E}" type="datetimeFigureOut">
               <a:rPr lang="en-US" smtClean="0"/>
-              <a:t>9/29/2021</a:t>
+              <a:t>10/1/2021</a:t>
             </a:fld>
             <a:endParaRPr lang="en-US"/>
           </a:p>
@@ -2992,7 +3016,7 @@
           <a:p>
             <a:fld id="{CC2D407D-9E44-4102-8064-F1AFBB4C770E}" type="datetimeFigureOut">
               <a:rPr lang="en-US" smtClean="0"/>
-              <a:t>9/29/2021</a:t>
+              <a:t>10/1/2021</a:t>
             </a:fld>
             <a:endParaRPr lang="en-US"/>
           </a:p>
@@ -3303,7 +3327,7 @@
           <a:p>
             <a:fld id="{CC2D407D-9E44-4102-8064-F1AFBB4C770E}" type="datetimeFigureOut">
               <a:rPr lang="en-US" smtClean="0"/>
-              <a:t>9/29/2021</a:t>
+              <a:t>10/1/2021</a:t>
             </a:fld>
             <a:endParaRPr lang="en-US"/>
           </a:p>
@@ -3591,7 +3615,7 @@
           <a:p>
             <a:fld id="{CC2D407D-9E44-4102-8064-F1AFBB4C770E}" type="datetimeFigureOut">
               <a:rPr lang="en-US" smtClean="0"/>
-              <a:t>9/29/2021</a:t>
+              <a:t>10/1/2021</a:t>
             </a:fld>
             <a:endParaRPr lang="en-US"/>
           </a:p>
@@ -3832,7 +3856,7 @@
           <a:p>
             <a:fld id="{CC2D407D-9E44-4102-8064-F1AFBB4C770E}" type="datetimeFigureOut">
               <a:rPr lang="en-US" smtClean="0"/>
-              <a:t>9/29/2021</a:t>
+              <a:t>10/1/2021</a:t>
             </a:fld>
             <a:endParaRPr lang="en-US"/>
           </a:p>
@@ -4377,6 +4401,1013 @@
           <a:prstGeom prst="rect">
             <a:avLst/>
           </a:prstGeom>
+        </p:spPr>
+      </p:pic>
+      <p:sp>
+        <p:nvSpPr>
+          <p:cNvPr id="2" name="TextBox 1">
+            <a:extLst>
+              <a:ext uri="{FF2B5EF4-FFF2-40B4-BE49-F238E27FC236}">
+                <a16:creationId xmlns:a16="http://schemas.microsoft.com/office/drawing/2014/main" id="{E069354B-5C72-4513-94E9-F03A10149E7C}"/>
+              </a:ext>
+            </a:extLst>
+          </p:cNvPr>
+          <p:cNvSpPr txBox="1"/>
+          <p:nvPr/>
+        </p:nvSpPr>
+        <p:spPr>
+          <a:xfrm>
+            <a:off x="0" y="0"/>
+            <a:ext cx="12117184" cy="861774"/>
+          </a:xfrm>
+          <a:prstGeom prst="rect">
+            <a:avLst/>
+          </a:prstGeom>
+          <a:noFill/>
+        </p:spPr>
+        <p:txBody>
+          <a:bodyPr wrap="square" rtlCol="0">
+            <a:spAutoFit/>
+          </a:bodyPr>
+          <a:lstStyle/>
+          <a:p>
+            <a:r>
+              <a:rPr lang="en-US" sz="1600" dirty="0"/>
+              <a:t>All lakes for a range of standard deviations -  LMP Annual Means – lakes with normally distributed data</a:t>
+            </a:r>
+          </a:p>
+          <a:p>
+            <a:r>
+              <a:rPr lang="en-US" sz="1600" dirty="0">
+                <a:solidFill>
+                  <a:srgbClr val="0000CC"/>
+                </a:solidFill>
+              </a:rPr>
+              <a:t>How many years of samples would we need to have an 80% probability of detecting an increase of X ug/L, </a:t>
+            </a:r>
+          </a:p>
+          <a:p>
+            <a:r>
+              <a:rPr lang="en-US" sz="1600" dirty="0">
+                <a:solidFill>
+                  <a:srgbClr val="0000CC"/>
+                </a:solidFill>
+              </a:rPr>
+              <a:t>with a p-value of 0.05, given a certain standard deviation?</a:t>
+            </a:r>
+          </a:p>
+        </p:txBody>
+      </p:sp>
+      <p:graphicFrame>
+        <p:nvGraphicFramePr>
+          <p:cNvPr id="7" name="Table 7">
+            <a:extLst>
+              <a:ext uri="{FF2B5EF4-FFF2-40B4-BE49-F238E27FC236}">
+                <a16:creationId xmlns:a16="http://schemas.microsoft.com/office/drawing/2014/main" id="{67EE4230-EB90-434B-88B4-AA62900B4E16}"/>
+              </a:ext>
+            </a:extLst>
+          </p:cNvPr>
+          <p:cNvGraphicFramePr>
+            <a:graphicFrameLocks noGrp="1"/>
+          </p:cNvGraphicFramePr>
+          <p:nvPr/>
+        </p:nvGraphicFramePr>
+        <p:xfrm>
+          <a:off x="7362825" y="1347549"/>
+          <a:ext cx="3333750" cy="3566160"/>
+        </p:xfrm>
+        <a:graphic>
+          <a:graphicData uri="http://schemas.openxmlformats.org/drawingml/2006/table">
+            <a:tbl>
+              <a:tblPr firstRow="1" bandRow="1">
+                <a:tableStyleId>{69CF1AB2-1976-4502-BF36-3FF5EA218861}</a:tableStyleId>
+              </a:tblPr>
+              <a:tblGrid>
+                <a:gridCol w="1562100">
+                  <a:extLst>
+                    <a:ext uri="{9D8B030D-6E8A-4147-A177-3AD203B41FA5}">
+                      <a16:colId xmlns:a16="http://schemas.microsoft.com/office/drawing/2014/main" val="4256267630"/>
+                    </a:ext>
+                  </a:extLst>
+                </a:gridCol>
+                <a:gridCol w="407146">
+                  <a:extLst>
+                    <a:ext uri="{9D8B030D-6E8A-4147-A177-3AD203B41FA5}">
+                      <a16:colId xmlns:a16="http://schemas.microsoft.com/office/drawing/2014/main" val="2261937681"/>
+                    </a:ext>
+                  </a:extLst>
+                </a:gridCol>
+                <a:gridCol w="626415">
+                  <a:extLst>
+                    <a:ext uri="{9D8B030D-6E8A-4147-A177-3AD203B41FA5}">
+                      <a16:colId xmlns:a16="http://schemas.microsoft.com/office/drawing/2014/main" val="1322094859"/>
+                    </a:ext>
+                  </a:extLst>
+                </a:gridCol>
+                <a:gridCol w="738089">
+                  <a:extLst>
+                    <a:ext uri="{9D8B030D-6E8A-4147-A177-3AD203B41FA5}">
+                      <a16:colId xmlns:a16="http://schemas.microsoft.com/office/drawing/2014/main" val="3153775163"/>
+                    </a:ext>
+                  </a:extLst>
+                </a:gridCol>
+              </a:tblGrid>
+              <a:tr h="246282">
+                <a:tc gridSpan="4">
+                  <a:txBody>
+                    <a:bodyPr/>
+                    <a:lstStyle/>
+                    <a:p>
+                      <a:pPr algn="ctr"/>
+                      <a:r>
+                        <a:rPr lang="en-US" sz="1200" dirty="0"/>
+                        <a:t>Some Example Lakes</a:t>
+                      </a:r>
+                    </a:p>
+                  </a:txBody>
+                  <a:tcPr/>
+                </a:tc>
+                <a:tc hMerge="1">
+                  <a:txBody>
+                    <a:bodyPr/>
+                    <a:lstStyle/>
+                    <a:p>
+                      <a:endParaRPr lang="en-US" sz="1200" dirty="0"/>
+                    </a:p>
+                  </a:txBody>
+                  <a:tcPr/>
+                </a:tc>
+                <a:tc hMerge="1">
+                  <a:txBody>
+                    <a:bodyPr/>
+                    <a:lstStyle/>
+                    <a:p>
+                      <a:endParaRPr lang="en-US" sz="1200" dirty="0"/>
+                    </a:p>
+                  </a:txBody>
+                  <a:tcPr/>
+                </a:tc>
+                <a:tc hMerge="1">
+                  <a:txBody>
+                    <a:bodyPr/>
+                    <a:lstStyle/>
+                    <a:p>
+                      <a:endParaRPr lang="en-US" sz="1200" dirty="0"/>
+                    </a:p>
+                  </a:txBody>
+                  <a:tcPr/>
+                </a:tc>
+                <a:extLst>
+                  <a:ext uri="{0D108BD9-81ED-4DB2-BD59-A6C34878D82A}">
+                    <a16:rowId xmlns:a16="http://schemas.microsoft.com/office/drawing/2014/main" val="2736464221"/>
+                  </a:ext>
+                </a:extLst>
+              </a:tr>
+              <a:tr h="246282">
+                <a:tc>
+                  <a:txBody>
+                    <a:bodyPr/>
+                    <a:lstStyle/>
+                    <a:p>
+                      <a:r>
+                        <a:rPr lang="en-US" sz="1200" b="1" dirty="0"/>
+                        <a:t>Lake</a:t>
+                      </a:r>
+                    </a:p>
+                  </a:txBody>
+                  <a:tcPr/>
+                </a:tc>
+                <a:tc>
+                  <a:txBody>
+                    <a:bodyPr/>
+                    <a:lstStyle/>
+                    <a:p>
+                      <a:r>
+                        <a:rPr lang="en-US" sz="1200" b="1" dirty="0"/>
+                        <a:t>N</a:t>
+                      </a:r>
+                    </a:p>
+                  </a:txBody>
+                  <a:tcPr/>
+                </a:tc>
+                <a:tc>
+                  <a:txBody>
+                    <a:bodyPr/>
+                    <a:lstStyle/>
+                    <a:p>
+                      <a:r>
+                        <a:rPr lang="en-US" sz="1200" b="1" dirty="0"/>
+                        <a:t>Mean</a:t>
+                      </a:r>
+                    </a:p>
+                  </a:txBody>
+                  <a:tcPr/>
+                </a:tc>
+                <a:tc>
+                  <a:txBody>
+                    <a:bodyPr/>
+                    <a:lstStyle/>
+                    <a:p>
+                      <a:r>
+                        <a:rPr lang="en-US" sz="1200" b="1" dirty="0"/>
+                        <a:t>St. Dev.</a:t>
+                      </a:r>
+                    </a:p>
+                  </a:txBody>
+                  <a:tcPr/>
+                </a:tc>
+                <a:extLst>
+                  <a:ext uri="{0D108BD9-81ED-4DB2-BD59-A6C34878D82A}">
+                    <a16:rowId xmlns:a16="http://schemas.microsoft.com/office/drawing/2014/main" val="2248649451"/>
+                  </a:ext>
+                </a:extLst>
+              </a:tr>
+              <a:tr h="246282">
+                <a:tc>
+                  <a:txBody>
+                    <a:bodyPr/>
+                    <a:lstStyle/>
+                    <a:p>
+                      <a:r>
+                        <a:rPr lang="en-US" sz="1200" dirty="0"/>
+                        <a:t>CARMI</a:t>
+                      </a:r>
+                    </a:p>
+                  </a:txBody>
+                  <a:tcPr/>
+                </a:tc>
+                <a:tc>
+                  <a:txBody>
+                    <a:bodyPr/>
+                    <a:lstStyle/>
+                    <a:p>
+                      <a:r>
+                        <a:rPr lang="en-US" sz="1200" dirty="0"/>
+                        <a:t>37</a:t>
+                      </a:r>
+                    </a:p>
+                  </a:txBody>
+                  <a:tcPr/>
+                </a:tc>
+                <a:tc>
+                  <a:txBody>
+                    <a:bodyPr/>
+                    <a:lstStyle/>
+                    <a:p>
+                      <a:r>
+                        <a:rPr lang="en-US" sz="1200" dirty="0"/>
+                        <a:t>30.9</a:t>
+                      </a:r>
+                    </a:p>
+                  </a:txBody>
+                  <a:tcPr/>
+                </a:tc>
+                <a:tc>
+                  <a:txBody>
+                    <a:bodyPr/>
+                    <a:lstStyle/>
+                    <a:p>
+                      <a:r>
+                        <a:rPr lang="en-US" sz="1200" dirty="0"/>
+                        <a:t>5.53</a:t>
+                      </a:r>
+                    </a:p>
+                  </a:txBody>
+                  <a:tcPr/>
+                </a:tc>
+                <a:extLst>
+                  <a:ext uri="{0D108BD9-81ED-4DB2-BD59-A6C34878D82A}">
+                    <a16:rowId xmlns:a16="http://schemas.microsoft.com/office/drawing/2014/main" val="94452239"/>
+                  </a:ext>
+                </a:extLst>
+              </a:tr>
+              <a:tr h="246282">
+                <a:tc>
+                  <a:txBody>
+                    <a:bodyPr/>
+                    <a:lstStyle/>
+                    <a:p>
+                      <a:pPr marL="0" marR="0" lvl="0" indent="0" algn="l" defTabSz="914400" rtl="0" eaLnBrk="1" fontAlgn="auto" latinLnBrk="0" hangingPunct="1">
+                        <a:lnSpc>
+                          <a:spcPct val="100000"/>
+                        </a:lnSpc>
+                        <a:spcBef>
+                          <a:spcPts val="0"/>
+                        </a:spcBef>
+                        <a:spcAft>
+                          <a:spcPts val="0"/>
+                        </a:spcAft>
+                        <a:buClrTx/>
+                        <a:buSzTx/>
+                        <a:buFontTx/>
+                        <a:buNone/>
+                        <a:tabLst/>
+                        <a:defRPr/>
+                      </a:pPr>
+                      <a:r>
+                        <a:rPr lang="en-US" sz="1200" dirty="0"/>
+                        <a:t>CASPIAN</a:t>
+                      </a:r>
+                    </a:p>
+                  </a:txBody>
+                  <a:tcPr/>
+                </a:tc>
+                <a:tc>
+                  <a:txBody>
+                    <a:bodyPr/>
+                    <a:lstStyle/>
+                    <a:p>
+                      <a:r>
+                        <a:rPr lang="en-US" sz="1200" dirty="0"/>
+                        <a:t>26</a:t>
+                      </a:r>
+                    </a:p>
+                  </a:txBody>
+                  <a:tcPr/>
+                </a:tc>
+                <a:tc>
+                  <a:txBody>
+                    <a:bodyPr/>
+                    <a:lstStyle/>
+                    <a:p>
+                      <a:r>
+                        <a:rPr lang="en-US" sz="1200" dirty="0"/>
+                        <a:t>9.3</a:t>
+                      </a:r>
+                    </a:p>
+                  </a:txBody>
+                  <a:tcPr/>
+                </a:tc>
+                <a:tc>
+                  <a:txBody>
+                    <a:bodyPr/>
+                    <a:lstStyle/>
+                    <a:p>
+                      <a:r>
+                        <a:rPr lang="en-US" sz="1200" dirty="0"/>
+                        <a:t>1.82</a:t>
+                      </a:r>
+                    </a:p>
+                  </a:txBody>
+                  <a:tcPr/>
+                </a:tc>
+                <a:extLst>
+                  <a:ext uri="{0D108BD9-81ED-4DB2-BD59-A6C34878D82A}">
+                    <a16:rowId xmlns:a16="http://schemas.microsoft.com/office/drawing/2014/main" val="3752780288"/>
+                  </a:ext>
+                </a:extLst>
+              </a:tr>
+              <a:tr h="246282">
+                <a:tc>
+                  <a:txBody>
+                    <a:bodyPr/>
+                    <a:lstStyle/>
+                    <a:p>
+                      <a:r>
+                        <a:rPr lang="en-US" sz="1200" dirty="0"/>
+                        <a:t>CURTIS</a:t>
+                      </a:r>
+                    </a:p>
+                  </a:txBody>
+                  <a:tcPr/>
+                </a:tc>
+                <a:tc>
+                  <a:txBody>
+                    <a:bodyPr/>
+                    <a:lstStyle/>
+                    <a:p>
+                      <a:r>
+                        <a:rPr lang="en-US" sz="1200" dirty="0"/>
+                        <a:t>25</a:t>
+                      </a:r>
+                    </a:p>
+                  </a:txBody>
+                  <a:tcPr/>
+                </a:tc>
+                <a:tc>
+                  <a:txBody>
+                    <a:bodyPr/>
+                    <a:lstStyle/>
+                    <a:p>
+                      <a:r>
+                        <a:rPr lang="en-US" sz="1200" dirty="0"/>
+                        <a:t>18.1</a:t>
+                      </a:r>
+                    </a:p>
+                  </a:txBody>
+                  <a:tcPr/>
+                </a:tc>
+                <a:tc>
+                  <a:txBody>
+                    <a:bodyPr/>
+                    <a:lstStyle/>
+                    <a:p>
+                      <a:r>
+                        <a:rPr lang="en-US" sz="1200" dirty="0"/>
+                        <a:t>3.58</a:t>
+                      </a:r>
+                    </a:p>
+                  </a:txBody>
+                  <a:tcPr/>
+                </a:tc>
+                <a:extLst>
+                  <a:ext uri="{0D108BD9-81ED-4DB2-BD59-A6C34878D82A}">
+                    <a16:rowId xmlns:a16="http://schemas.microsoft.com/office/drawing/2014/main" val="2753738978"/>
+                  </a:ext>
+                </a:extLst>
+              </a:tr>
+              <a:tr h="246282">
+                <a:tc>
+                  <a:txBody>
+                    <a:bodyPr/>
+                    <a:lstStyle/>
+                    <a:p>
+                      <a:r>
+                        <a:rPr lang="en-US" sz="1200" dirty="0"/>
+                        <a:t>DUNMORE</a:t>
+                      </a:r>
+                    </a:p>
+                  </a:txBody>
+                  <a:tcPr/>
+                </a:tc>
+                <a:tc>
+                  <a:txBody>
+                    <a:bodyPr/>
+                    <a:lstStyle/>
+                    <a:p>
+                      <a:r>
+                        <a:rPr lang="en-US" sz="1200" dirty="0"/>
+                        <a:t>23</a:t>
+                      </a:r>
+                    </a:p>
+                  </a:txBody>
+                  <a:tcPr/>
+                </a:tc>
+                <a:tc>
+                  <a:txBody>
+                    <a:bodyPr/>
+                    <a:lstStyle/>
+                    <a:p>
+                      <a:r>
+                        <a:rPr lang="en-US" sz="1200" dirty="0"/>
+                        <a:t>12.8</a:t>
+                      </a:r>
+                    </a:p>
+                  </a:txBody>
+                  <a:tcPr/>
+                </a:tc>
+                <a:tc>
+                  <a:txBody>
+                    <a:bodyPr/>
+                    <a:lstStyle/>
+                    <a:p>
+                      <a:r>
+                        <a:rPr lang="en-US" sz="1200" dirty="0"/>
+                        <a:t>2.73</a:t>
+                      </a:r>
+                    </a:p>
+                  </a:txBody>
+                  <a:tcPr/>
+                </a:tc>
+                <a:extLst>
+                  <a:ext uri="{0D108BD9-81ED-4DB2-BD59-A6C34878D82A}">
+                    <a16:rowId xmlns:a16="http://schemas.microsoft.com/office/drawing/2014/main" val="750290730"/>
+                  </a:ext>
+                </a:extLst>
+              </a:tr>
+              <a:tr h="246282">
+                <a:tc>
+                  <a:txBody>
+                    <a:bodyPr/>
+                    <a:lstStyle/>
+                    <a:p>
+                      <a:r>
+                        <a:rPr lang="en-US" sz="1200" dirty="0"/>
+                        <a:t>JOES (DANVLL)</a:t>
+                      </a:r>
+                    </a:p>
+                  </a:txBody>
+                  <a:tcPr/>
+                </a:tc>
+                <a:tc>
+                  <a:txBody>
+                    <a:bodyPr/>
+                    <a:lstStyle/>
+                    <a:p>
+                      <a:r>
+                        <a:rPr lang="en-US" sz="1200" dirty="0"/>
+                        <a:t>14</a:t>
+                      </a:r>
+                    </a:p>
+                  </a:txBody>
+                  <a:tcPr/>
+                </a:tc>
+                <a:tc>
+                  <a:txBody>
+                    <a:bodyPr/>
+                    <a:lstStyle/>
+                    <a:p>
+                      <a:r>
+                        <a:rPr lang="en-US" sz="1200" dirty="0"/>
+                        <a:t>20.2</a:t>
+                      </a:r>
+                    </a:p>
+                  </a:txBody>
+                  <a:tcPr/>
+                </a:tc>
+                <a:tc>
+                  <a:txBody>
+                    <a:bodyPr/>
+                    <a:lstStyle/>
+                    <a:p>
+                      <a:r>
+                        <a:rPr lang="en-US" sz="1200" dirty="0"/>
+                        <a:t>7.24</a:t>
+                      </a:r>
+                    </a:p>
+                  </a:txBody>
+                  <a:tcPr/>
+                </a:tc>
+                <a:extLst>
+                  <a:ext uri="{0D108BD9-81ED-4DB2-BD59-A6C34878D82A}">
+                    <a16:rowId xmlns:a16="http://schemas.microsoft.com/office/drawing/2014/main" val="3939792130"/>
+                  </a:ext>
+                </a:extLst>
+              </a:tr>
+              <a:tr h="246282">
+                <a:tc>
+                  <a:txBody>
+                    <a:bodyPr/>
+                    <a:lstStyle/>
+                    <a:p>
+                      <a:r>
+                        <a:rPr lang="en-US" sz="1200" dirty="0"/>
+                        <a:t>MAIDSTONE</a:t>
+                      </a:r>
+                    </a:p>
+                  </a:txBody>
+                  <a:tcPr>
+                    <a:solidFill>
+                      <a:srgbClr val="F8766D"/>
+                    </a:solidFill>
+                  </a:tcPr>
+                </a:tc>
+                <a:tc>
+                  <a:txBody>
+                    <a:bodyPr/>
+                    <a:lstStyle/>
+                    <a:p>
+                      <a:r>
+                        <a:rPr lang="en-US" sz="1200" dirty="0"/>
+                        <a:t>26</a:t>
+                      </a:r>
+                    </a:p>
+                  </a:txBody>
+                  <a:tcPr>
+                    <a:solidFill>
+                      <a:srgbClr val="F8766D"/>
+                    </a:solidFill>
+                  </a:tcPr>
+                </a:tc>
+                <a:tc>
+                  <a:txBody>
+                    <a:bodyPr/>
+                    <a:lstStyle/>
+                    <a:p>
+                      <a:r>
+                        <a:rPr lang="en-US" sz="1200" dirty="0"/>
+                        <a:t>6.8</a:t>
+                      </a:r>
+                    </a:p>
+                  </a:txBody>
+                  <a:tcPr>
+                    <a:solidFill>
+                      <a:srgbClr val="F8766D"/>
+                    </a:solidFill>
+                  </a:tcPr>
+                </a:tc>
+                <a:tc>
+                  <a:txBody>
+                    <a:bodyPr/>
+                    <a:lstStyle/>
+                    <a:p>
+                      <a:r>
+                        <a:rPr lang="en-US" sz="1200" dirty="0"/>
+                        <a:t>1.09</a:t>
+                      </a:r>
+                    </a:p>
+                  </a:txBody>
+                  <a:tcPr>
+                    <a:solidFill>
+                      <a:srgbClr val="F8766D"/>
+                    </a:solidFill>
+                  </a:tcPr>
+                </a:tc>
+                <a:extLst>
+                  <a:ext uri="{0D108BD9-81ED-4DB2-BD59-A6C34878D82A}">
+                    <a16:rowId xmlns:a16="http://schemas.microsoft.com/office/drawing/2014/main" val="3200487020"/>
+                  </a:ext>
+                </a:extLst>
+              </a:tr>
+              <a:tr h="246282">
+                <a:tc>
+                  <a:txBody>
+                    <a:bodyPr/>
+                    <a:lstStyle/>
+                    <a:p>
+                      <a:r>
+                        <a:rPr lang="en-US" sz="1200" dirty="0"/>
+                        <a:t>MEMPHREMAGOG</a:t>
+                      </a:r>
+                    </a:p>
+                  </a:txBody>
+                  <a:tcPr/>
+                </a:tc>
+                <a:tc>
+                  <a:txBody>
+                    <a:bodyPr/>
+                    <a:lstStyle/>
+                    <a:p>
+                      <a:r>
+                        <a:rPr lang="en-US" sz="1200" dirty="0"/>
+                        <a:t>27</a:t>
+                      </a:r>
+                    </a:p>
+                  </a:txBody>
+                  <a:tcPr/>
+                </a:tc>
+                <a:tc>
+                  <a:txBody>
+                    <a:bodyPr/>
+                    <a:lstStyle/>
+                    <a:p>
+                      <a:r>
+                        <a:rPr lang="en-US" sz="1200" dirty="0"/>
+                        <a:t>19.3</a:t>
+                      </a:r>
+                    </a:p>
+                  </a:txBody>
+                  <a:tcPr/>
+                </a:tc>
+                <a:tc>
+                  <a:txBody>
+                    <a:bodyPr/>
+                    <a:lstStyle/>
+                    <a:p>
+                      <a:r>
+                        <a:rPr lang="en-US" sz="1200" dirty="0"/>
+                        <a:t>3.13</a:t>
+                      </a:r>
+                    </a:p>
+                  </a:txBody>
+                  <a:tcPr/>
+                </a:tc>
+                <a:extLst>
+                  <a:ext uri="{0D108BD9-81ED-4DB2-BD59-A6C34878D82A}">
+                    <a16:rowId xmlns:a16="http://schemas.microsoft.com/office/drawing/2014/main" val="31395098"/>
+                  </a:ext>
+                </a:extLst>
+              </a:tr>
+              <a:tr h="246282">
+                <a:tc>
+                  <a:txBody>
+                    <a:bodyPr/>
+                    <a:lstStyle/>
+                    <a:p>
+                      <a:r>
+                        <a:rPr lang="en-US" sz="1200" dirty="0"/>
+                        <a:t>RAPONDA</a:t>
+                      </a:r>
+                    </a:p>
+                  </a:txBody>
+                  <a:tcPr/>
+                </a:tc>
+                <a:tc>
+                  <a:txBody>
+                    <a:bodyPr/>
+                    <a:lstStyle/>
+                    <a:p>
+                      <a:r>
+                        <a:rPr lang="en-US" sz="1200" dirty="0"/>
+                        <a:t>18</a:t>
+                      </a:r>
+                    </a:p>
+                  </a:txBody>
+                  <a:tcPr/>
+                </a:tc>
+                <a:tc>
+                  <a:txBody>
+                    <a:bodyPr/>
+                    <a:lstStyle/>
+                    <a:p>
+                      <a:r>
+                        <a:rPr lang="en-US" sz="1200" dirty="0"/>
+                        <a:t>11.4</a:t>
+                      </a:r>
+                    </a:p>
+                  </a:txBody>
+                  <a:tcPr/>
+                </a:tc>
+                <a:tc>
+                  <a:txBody>
+                    <a:bodyPr/>
+                    <a:lstStyle/>
+                    <a:p>
+                      <a:r>
+                        <a:rPr lang="en-US" sz="1200" dirty="0"/>
+                        <a:t>2.00</a:t>
+                      </a:r>
+                    </a:p>
+                  </a:txBody>
+                  <a:tcPr/>
+                </a:tc>
+                <a:extLst>
+                  <a:ext uri="{0D108BD9-81ED-4DB2-BD59-A6C34878D82A}">
+                    <a16:rowId xmlns:a16="http://schemas.microsoft.com/office/drawing/2014/main" val="130211755"/>
+                  </a:ext>
+                </a:extLst>
+              </a:tr>
+              <a:tr h="246282">
+                <a:tc>
+                  <a:txBody>
+                    <a:bodyPr/>
+                    <a:lstStyle/>
+                    <a:p>
+                      <a:r>
+                        <a:rPr lang="en-US" sz="1200" dirty="0"/>
+                        <a:t>SEYMOUR</a:t>
+                      </a:r>
+                    </a:p>
+                  </a:txBody>
+                  <a:tcPr/>
+                </a:tc>
+                <a:tc>
+                  <a:txBody>
+                    <a:bodyPr/>
+                    <a:lstStyle/>
+                    <a:p>
+                      <a:r>
+                        <a:rPr lang="en-US" sz="1200" dirty="0"/>
+                        <a:t>23</a:t>
+                      </a:r>
+                    </a:p>
+                  </a:txBody>
+                  <a:tcPr/>
+                </a:tc>
+                <a:tc>
+                  <a:txBody>
+                    <a:bodyPr/>
+                    <a:lstStyle/>
+                    <a:p>
+                      <a:r>
+                        <a:rPr lang="en-US" sz="1200" dirty="0"/>
+                        <a:t>9.0</a:t>
+                      </a:r>
+                    </a:p>
+                  </a:txBody>
+                  <a:tcPr/>
+                </a:tc>
+                <a:tc>
+                  <a:txBody>
+                    <a:bodyPr/>
+                    <a:lstStyle/>
+                    <a:p>
+                      <a:r>
+                        <a:rPr lang="en-US" sz="1200" dirty="0"/>
+                        <a:t>2.41</a:t>
+                      </a:r>
+                    </a:p>
+                  </a:txBody>
+                  <a:tcPr/>
+                </a:tc>
+                <a:extLst>
+                  <a:ext uri="{0D108BD9-81ED-4DB2-BD59-A6C34878D82A}">
+                    <a16:rowId xmlns:a16="http://schemas.microsoft.com/office/drawing/2014/main" val="243275096"/>
+                  </a:ext>
+                </a:extLst>
+              </a:tr>
+              <a:tr h="246282">
+                <a:tc>
+                  <a:txBody>
+                    <a:bodyPr/>
+                    <a:lstStyle/>
+                    <a:p>
+                      <a:r>
+                        <a:rPr lang="en-US" sz="1200" dirty="0"/>
+                        <a:t>SHELBURNE</a:t>
+                      </a:r>
+                    </a:p>
+                  </a:txBody>
+                  <a:tcPr/>
+                </a:tc>
+                <a:tc>
+                  <a:txBody>
+                    <a:bodyPr/>
+                    <a:lstStyle/>
+                    <a:p>
+                      <a:r>
+                        <a:rPr lang="en-US" sz="1200" dirty="0"/>
+                        <a:t>6</a:t>
+                      </a:r>
+                    </a:p>
+                  </a:txBody>
+                  <a:tcPr/>
+                </a:tc>
+                <a:tc>
+                  <a:txBody>
+                    <a:bodyPr/>
+                    <a:lstStyle/>
+                    <a:p>
+                      <a:r>
+                        <a:rPr lang="en-US" sz="1200" dirty="0"/>
+                        <a:t>151.4</a:t>
+                      </a:r>
+                    </a:p>
+                  </a:txBody>
+                  <a:tcPr/>
+                </a:tc>
+                <a:tc>
+                  <a:txBody>
+                    <a:bodyPr/>
+                    <a:lstStyle/>
+                    <a:p>
+                      <a:r>
+                        <a:rPr lang="en-US" sz="1200" dirty="0"/>
+                        <a:t>38.20</a:t>
+                      </a:r>
+                    </a:p>
+                  </a:txBody>
+                  <a:tcPr/>
+                </a:tc>
+                <a:extLst>
+                  <a:ext uri="{0D108BD9-81ED-4DB2-BD59-A6C34878D82A}">
+                    <a16:rowId xmlns:a16="http://schemas.microsoft.com/office/drawing/2014/main" val="2340048807"/>
+                  </a:ext>
+                </a:extLst>
+              </a:tr>
+              <a:tr h="246282">
+                <a:tc>
+                  <a:txBody>
+                    <a:bodyPr/>
+                    <a:lstStyle/>
+                    <a:p>
+                      <a:r>
+                        <a:rPr lang="en-US" sz="1200" dirty="0"/>
+                        <a:t>WILLOUGHBY</a:t>
+                      </a:r>
+                    </a:p>
+                  </a:txBody>
+                  <a:tcPr/>
+                </a:tc>
+                <a:tc>
+                  <a:txBody>
+                    <a:bodyPr/>
+                    <a:lstStyle/>
+                    <a:p>
+                      <a:r>
+                        <a:rPr lang="en-US" sz="1200" dirty="0"/>
+                        <a:t>25</a:t>
+                      </a:r>
+                    </a:p>
+                  </a:txBody>
+                  <a:tcPr/>
+                </a:tc>
+                <a:tc>
+                  <a:txBody>
+                    <a:bodyPr/>
+                    <a:lstStyle/>
+                    <a:p>
+                      <a:r>
+                        <a:rPr lang="en-US" sz="1200" dirty="0"/>
+                        <a:t>10.5</a:t>
+                      </a:r>
+                    </a:p>
+                  </a:txBody>
+                  <a:tcPr/>
+                </a:tc>
+                <a:tc>
+                  <a:txBody>
+                    <a:bodyPr/>
+                    <a:lstStyle/>
+                    <a:p>
+                      <a:r>
+                        <a:rPr lang="en-US" sz="1200" dirty="0"/>
+                        <a:t>3.70</a:t>
+                      </a:r>
+                    </a:p>
+                  </a:txBody>
+                  <a:tcPr/>
+                </a:tc>
+                <a:extLst>
+                  <a:ext uri="{0D108BD9-81ED-4DB2-BD59-A6C34878D82A}">
+                    <a16:rowId xmlns:a16="http://schemas.microsoft.com/office/drawing/2014/main" val="2021891949"/>
+                  </a:ext>
+                </a:extLst>
+              </a:tr>
+            </a:tbl>
+          </a:graphicData>
+        </a:graphic>
+      </p:graphicFrame>
+      <p:cxnSp>
+        <p:nvCxnSpPr>
+          <p:cNvPr id="4" name="Straight Connector 3">
+            <a:extLst>
+              <a:ext uri="{FF2B5EF4-FFF2-40B4-BE49-F238E27FC236}">
+                <a16:creationId xmlns:a16="http://schemas.microsoft.com/office/drawing/2014/main" id="{C4E4FE7E-A2A4-46ED-99FC-AD892FF8C7DA}"/>
+              </a:ext>
+            </a:extLst>
+          </p:cNvPr>
+          <p:cNvCxnSpPr/>
+          <p:nvPr/>
+        </p:nvCxnSpPr>
+        <p:spPr>
+          <a:xfrm>
+            <a:off x="790575" y="5724525"/>
+            <a:ext cx="9906000" cy="0"/>
+          </a:xfrm>
+          <a:prstGeom prst="line">
+            <a:avLst/>
+          </a:prstGeom>
+          <a:ln w="19050">
+            <a:solidFill>
+              <a:schemeClr val="tx1"/>
+            </a:solidFill>
+            <a:prstDash val="sysDash"/>
+          </a:ln>
+        </p:spPr>
+        <p:style>
+          <a:lnRef idx="1">
+            <a:schemeClr val="accent1"/>
+          </a:lnRef>
+          <a:fillRef idx="0">
+            <a:schemeClr val="accent1"/>
+          </a:fillRef>
+          <a:effectRef idx="0">
+            <a:schemeClr val="accent1"/>
+          </a:effectRef>
+          <a:fontRef idx="minor">
+            <a:schemeClr val="tx1"/>
+          </a:fontRef>
+        </p:style>
+      </p:cxnSp>
+    </p:spTree>
+    <p:extLst>
+      <p:ext uri="{BB962C8B-B14F-4D97-AF65-F5344CB8AC3E}">
+        <p14:creationId xmlns:p14="http://schemas.microsoft.com/office/powerpoint/2010/main" val="736114940"/>
+      </p:ext>
+    </p:extLst>
+  </p:cSld>
+  <p:clrMapOvr>
+    <a:masterClrMapping/>
+  </p:clrMapOvr>
+</p:sld>
+</file>
+
+<file path=ppt/slides/slide11.xml><?xml version="1.0" encoding="utf-8"?>
+<p:sld xmlns:a="http://schemas.openxmlformats.org/drawingml/2006/main" xmlns:r="http://schemas.openxmlformats.org/officeDocument/2006/relationships" xmlns:p="http://schemas.openxmlformats.org/presentationml/2006/main">
+  <p:cSld>
+    <p:spTree>
+      <p:nvGrpSpPr>
+        <p:cNvPr id="1" name=""/>
+        <p:cNvGrpSpPr/>
+        <p:nvPr/>
+      </p:nvGrpSpPr>
+      <p:grpSpPr>
+        <a:xfrm>
+          <a:off x="0" y="0"/>
+          <a:ext cx="0" cy="0"/>
+          <a:chOff x="0" y="0"/>
+          <a:chExt cx="0" cy="0"/>
+        </a:xfrm>
+      </p:grpSpPr>
+      <p:pic>
+        <p:nvPicPr>
+          <p:cNvPr id="12" name="Picture 11">
+            <a:extLst>
+              <a:ext uri="{FF2B5EF4-FFF2-40B4-BE49-F238E27FC236}">
+                <a16:creationId xmlns:a16="http://schemas.microsoft.com/office/drawing/2014/main" id="{A920B7EE-EB98-4FCE-94F4-402190683D00}"/>
+              </a:ext>
+            </a:extLst>
+          </p:cNvPr>
+          <p:cNvPicPr>
+            <a:picLocks noChangeAspect="1"/>
+          </p:cNvPicPr>
+          <p:nvPr/>
+        </p:nvPicPr>
+        <p:blipFill>
+          <a:blip r:embed="rId2"/>
+          <a:stretch>
+            <a:fillRect/>
+          </a:stretch>
+        </p:blipFill>
+        <p:spPr>
+          <a:xfrm>
+            <a:off x="276940" y="942974"/>
+            <a:ext cx="11667410" cy="5833705"/>
+          </a:xfrm>
+          <a:prstGeom prst="rect">
+            <a:avLst/>
+          </a:prstGeom>
           <a:solidFill>
             <a:srgbClr val="00C094"/>
           </a:solidFill>
@@ -5394,7 +6425,7 @@
 </p:sld>
 </file>
 
-<file path=ppt/slides/slide11.xml><?xml version="1.0" encoding="utf-8"?>
+<file path=ppt/slides/slide12.xml><?xml version="1.0" encoding="utf-8"?>
 <p:sld xmlns:a="http://schemas.openxmlformats.org/drawingml/2006/main" xmlns:r="http://schemas.openxmlformats.org/officeDocument/2006/relationships" xmlns:p="http://schemas.openxmlformats.org/presentationml/2006/main">
   <p:cSld>
     <p:spTree>
@@ -5547,7 +6578,7 @@
 </p:sld>
 </file>
 
-<file path=ppt/slides/slide12.xml><?xml version="1.0" encoding="utf-8"?>
+<file path=ppt/slides/slide13.xml><?xml version="1.0" encoding="utf-8"?>
 <p:sld xmlns:a="http://schemas.openxmlformats.org/drawingml/2006/main" xmlns:r="http://schemas.openxmlformats.org/officeDocument/2006/relationships" xmlns:p="http://schemas.openxmlformats.org/presentationml/2006/main">
   <p:cSld>
     <p:spTree>
@@ -6606,7 +7637,7 @@
 </p:sld>
 </file>
 
-<file path=ppt/slides/slide13.xml><?xml version="1.0" encoding="utf-8"?>
+<file path=ppt/slides/slide14.xml><?xml version="1.0" encoding="utf-8"?>
 <p:sld xmlns:a="http://schemas.openxmlformats.org/drawingml/2006/main" xmlns:r="http://schemas.openxmlformats.org/officeDocument/2006/relationships" xmlns:p="http://schemas.openxmlformats.org/presentationml/2006/main">
   <p:cSld>
     <p:spTree>
@@ -7613,7 +8644,7 @@
 </p:sld>
 </file>
 
-<file path=ppt/slides/slide14.xml><?xml version="1.0" encoding="utf-8"?>
+<file path=ppt/slides/slide15.xml><?xml version="1.0" encoding="utf-8"?>
 <p:sld xmlns:a="http://schemas.openxmlformats.org/drawingml/2006/main" xmlns:r="http://schemas.openxmlformats.org/officeDocument/2006/relationships" xmlns:p="http://schemas.openxmlformats.org/presentationml/2006/main">
   <p:cSld>
     <p:spTree>
@@ -8669,7 +9700,7 @@
 </p:sld>
 </file>
 
-<file path=ppt/slides/slide15.xml><?xml version="1.0" encoding="utf-8"?>
+<file path=ppt/slides/slide16.xml><?xml version="1.0" encoding="utf-8"?>
 <p:sld xmlns:a="http://schemas.openxmlformats.org/drawingml/2006/main" xmlns:r="http://schemas.openxmlformats.org/officeDocument/2006/relationships" xmlns:p="http://schemas.openxmlformats.org/presentationml/2006/main">
   <p:cSld>
     <p:spTree>
@@ -9813,7 +10844,7 @@
 </p:sld>
 </file>
 
-<file path=ppt/slides/slide16.xml><?xml version="1.0" encoding="utf-8"?>
+<file path=ppt/slides/slide17.xml><?xml version="1.0" encoding="utf-8"?>
 <p:sld xmlns:a="http://schemas.openxmlformats.org/drawingml/2006/main" xmlns:r="http://schemas.openxmlformats.org/officeDocument/2006/relationships" xmlns:p="http://schemas.openxmlformats.org/presentationml/2006/main">
   <p:cSld>
     <p:spTree>
@@ -9960,7 +10991,7 @@
 </p:sld>
 </file>
 
-<file path=ppt/slides/slide17.xml><?xml version="1.0" encoding="utf-8"?>
+<file path=ppt/slides/slide18.xml><?xml version="1.0" encoding="utf-8"?>
 <p:sld xmlns:a="http://schemas.openxmlformats.org/drawingml/2006/main" xmlns:r="http://schemas.openxmlformats.org/officeDocument/2006/relationships" xmlns:p="http://schemas.openxmlformats.org/presentationml/2006/main">
   <p:cSld>
     <p:spTree>
@@ -10194,7 +11225,7 @@
 </p:sld>
 </file>
 
-<file path=ppt/slides/slide18.xml><?xml version="1.0" encoding="utf-8"?>
+<file path=ppt/slides/slide19.xml><?xml version="1.0" encoding="utf-8"?>
 <p:sld xmlns:a="http://schemas.openxmlformats.org/drawingml/2006/main" xmlns:r="http://schemas.openxmlformats.org/officeDocument/2006/relationships" xmlns:p="http://schemas.openxmlformats.org/presentationml/2006/main">
   <p:cSld>
     <p:spTree>
@@ -10418,7 +11449,7 @@
             </a:pPr>
             <a:r>
               <a:rPr lang="en-US" sz="2400" dirty="0"/>
-              <a:t>How many samples do we need to collect to be reasonably sure we would find a signal amidst that noise?</a:t>
+              <a:t>How many samples do we need to collect to be reasonably sure we would find a signal amidst that noise, if it were there?</a:t>
             </a:r>
           </a:p>
           <a:p>
@@ -11168,6 +12199,121 @@
       </p:grpSpPr>
       <p:sp>
         <p:nvSpPr>
+          <p:cNvPr id="2" name="Rectangle 1">
+            <a:extLst>
+              <a:ext uri="{FF2B5EF4-FFF2-40B4-BE49-F238E27FC236}">
+                <a16:creationId xmlns:a16="http://schemas.microsoft.com/office/drawing/2014/main" id="{350E231E-FFBA-4710-B6D3-171560616F6E}"/>
+              </a:ext>
+            </a:extLst>
+          </p:cNvPr>
+          <p:cNvSpPr/>
+          <p:nvPr/>
+        </p:nvSpPr>
+        <p:spPr>
+          <a:xfrm>
+            <a:off x="190919" y="160774"/>
+            <a:ext cx="11284299" cy="602901"/>
+          </a:xfrm>
+          <a:prstGeom prst="rect">
+            <a:avLst/>
+          </a:prstGeom>
+          <a:noFill/>
+          <a:ln>
+            <a:noFill/>
+          </a:ln>
+        </p:spPr>
+        <p:style>
+          <a:lnRef idx="2">
+            <a:schemeClr val="accent1">
+              <a:shade val="50000"/>
+            </a:schemeClr>
+          </a:lnRef>
+          <a:fillRef idx="1">
+            <a:schemeClr val="accent1"/>
+          </a:fillRef>
+          <a:effectRef idx="0">
+            <a:schemeClr val="accent1"/>
+          </a:effectRef>
+          <a:fontRef idx="minor">
+            <a:schemeClr val="lt1"/>
+          </a:fontRef>
+        </p:style>
+        <p:txBody>
+          <a:bodyPr rtlCol="0" anchor="ctr"/>
+          <a:lstStyle/>
+          <a:p>
+            <a:pPr algn="ctr"/>
+            <a:endParaRPr lang="en-US"/>
+          </a:p>
+        </p:txBody>
+      </p:sp>
+      <p:sp>
+        <p:nvSpPr>
+          <p:cNvPr id="3" name="TextBox 2">
+            <a:extLst>
+              <a:ext uri="{FF2B5EF4-FFF2-40B4-BE49-F238E27FC236}">
+                <a16:creationId xmlns:a16="http://schemas.microsoft.com/office/drawing/2014/main" id="{BD2C85E6-524A-4C9C-BDCD-BCCFFC799AD3}"/>
+              </a:ext>
+            </a:extLst>
+          </p:cNvPr>
+          <p:cNvSpPr txBox="1"/>
+          <p:nvPr/>
+        </p:nvSpPr>
+        <p:spPr>
+          <a:xfrm>
+            <a:off x="190919" y="92892"/>
+            <a:ext cx="10982848" cy="369332"/>
+          </a:xfrm>
+          <a:prstGeom prst="rect">
+            <a:avLst/>
+          </a:prstGeom>
+          <a:noFill/>
+        </p:spPr>
+        <p:txBody>
+          <a:bodyPr wrap="square" rtlCol="0">
+            <a:spAutoFit/>
+          </a:bodyPr>
+          <a:lstStyle/>
+          <a:p>
+            <a:r>
+              <a:rPr lang="en-US" dirty="0"/>
+              <a:t>What Standard Deviation should we assume in order to calculate our effect size?</a:t>
+            </a:r>
+          </a:p>
+        </p:txBody>
+      </p:sp>
+    </p:spTree>
+    <p:extLst>
+      <p:ext uri="{BB962C8B-B14F-4D97-AF65-F5344CB8AC3E}">
+        <p14:creationId xmlns:p14="http://schemas.microsoft.com/office/powerpoint/2010/main" val="1742172774"/>
+      </p:ext>
+    </p:extLst>
+  </p:cSld>
+  <p:clrMapOvr>
+    <a:masterClrMapping/>
+  </p:clrMapOvr>
+</p:sld>
+</file>
+
+<file path=ppt/slides/slide7.xml><?xml version="1.0" encoding="utf-8"?>
+<p:sld xmlns:a="http://schemas.openxmlformats.org/drawingml/2006/main" xmlns:r="http://schemas.openxmlformats.org/officeDocument/2006/relationships" xmlns:p="http://schemas.openxmlformats.org/presentationml/2006/main">
+  <p:cSld>
+    <p:spTree>
+      <p:nvGrpSpPr>
+        <p:cNvPr id="1" name=""/>
+        <p:cNvGrpSpPr/>
+        <p:nvPr/>
+      </p:nvGrpSpPr>
+      <p:grpSpPr>
+        <a:xfrm>
+          <a:off x="0" y="0"/>
+          <a:ext cx="0" cy="0"/>
+          <a:chOff x="0" y="0"/>
+          <a:chExt cx="0" cy="0"/>
+        </a:xfrm>
+      </p:grpSpPr>
+      <p:sp>
+        <p:nvSpPr>
           <p:cNvPr id="2" name="TextBox 1">
             <a:extLst>
               <a:ext uri="{FF2B5EF4-FFF2-40B4-BE49-F238E27FC236}">
@@ -11293,955 +12439,6 @@
     <p:extLst>
       <p:ext uri="{BB962C8B-B14F-4D97-AF65-F5344CB8AC3E}">
         <p14:creationId xmlns:p14="http://schemas.microsoft.com/office/powerpoint/2010/main" val="596191645"/>
-      </p:ext>
-    </p:extLst>
-  </p:cSld>
-  <p:clrMapOvr>
-    <a:masterClrMapping/>
-  </p:clrMapOvr>
-</p:sld>
-</file>
-
-<file path=ppt/slides/slide7.xml><?xml version="1.0" encoding="utf-8"?>
-<p:sld xmlns:a="http://schemas.openxmlformats.org/drawingml/2006/main" xmlns:r="http://schemas.openxmlformats.org/officeDocument/2006/relationships" xmlns:p="http://schemas.openxmlformats.org/presentationml/2006/main">
-  <p:cSld>
-    <p:spTree>
-      <p:nvGrpSpPr>
-        <p:cNvPr id="1" name=""/>
-        <p:cNvGrpSpPr/>
-        <p:nvPr/>
-      </p:nvGrpSpPr>
-      <p:grpSpPr>
-        <a:xfrm>
-          <a:off x="0" y="0"/>
-          <a:ext cx="0" cy="0"/>
-          <a:chOff x="0" y="0"/>
-          <a:chExt cx="0" cy="0"/>
-        </a:xfrm>
-      </p:grpSpPr>
-      <p:pic>
-        <p:nvPicPr>
-          <p:cNvPr id="12" name="Picture 11">
-            <a:extLst>
-              <a:ext uri="{FF2B5EF4-FFF2-40B4-BE49-F238E27FC236}">
-                <a16:creationId xmlns:a16="http://schemas.microsoft.com/office/drawing/2014/main" id="{A920B7EE-EB98-4FCE-94F4-402190683D00}"/>
-              </a:ext>
-            </a:extLst>
-          </p:cNvPr>
-          <p:cNvPicPr>
-            <a:picLocks noChangeAspect="1"/>
-          </p:cNvPicPr>
-          <p:nvPr/>
-        </p:nvPicPr>
-        <p:blipFill>
-          <a:blip r:embed="rId2"/>
-          <a:stretch>
-            <a:fillRect/>
-          </a:stretch>
-        </p:blipFill>
-        <p:spPr>
-          <a:xfrm>
-            <a:off x="276940" y="942974"/>
-            <a:ext cx="11667410" cy="5833705"/>
-          </a:xfrm>
-          <a:prstGeom prst="rect">
-            <a:avLst/>
-          </a:prstGeom>
-        </p:spPr>
-      </p:pic>
-      <p:sp>
-        <p:nvSpPr>
-          <p:cNvPr id="2" name="TextBox 1">
-            <a:extLst>
-              <a:ext uri="{FF2B5EF4-FFF2-40B4-BE49-F238E27FC236}">
-                <a16:creationId xmlns:a16="http://schemas.microsoft.com/office/drawing/2014/main" id="{E069354B-5C72-4513-94E9-F03A10149E7C}"/>
-              </a:ext>
-            </a:extLst>
-          </p:cNvPr>
-          <p:cNvSpPr txBox="1"/>
-          <p:nvPr/>
-        </p:nvSpPr>
-        <p:spPr>
-          <a:xfrm>
-            <a:off x="0" y="0"/>
-            <a:ext cx="12117184" cy="861774"/>
-          </a:xfrm>
-          <a:prstGeom prst="rect">
-            <a:avLst/>
-          </a:prstGeom>
-          <a:noFill/>
-        </p:spPr>
-        <p:txBody>
-          <a:bodyPr wrap="square" rtlCol="0">
-            <a:spAutoFit/>
-          </a:bodyPr>
-          <a:lstStyle/>
-          <a:p>
-            <a:r>
-              <a:rPr lang="en-US" sz="1600" dirty="0"/>
-              <a:t>All lakes for a range of standard deviations -  LMP Annual Means – lakes with normally distributed data</a:t>
-            </a:r>
-          </a:p>
-          <a:p>
-            <a:r>
-              <a:rPr lang="en-US" sz="1600" dirty="0">
-                <a:solidFill>
-                  <a:srgbClr val="0000CC"/>
-                </a:solidFill>
-              </a:rPr>
-              <a:t>How many years of samples would we need to have an 80% probability of detecting an increase of X ug/L, </a:t>
-            </a:r>
-          </a:p>
-          <a:p>
-            <a:r>
-              <a:rPr lang="en-US" sz="1600" dirty="0">
-                <a:solidFill>
-                  <a:srgbClr val="0000CC"/>
-                </a:solidFill>
-              </a:rPr>
-              <a:t>with a p-value of 0.05, given a certain standard deviation?</a:t>
-            </a:r>
-          </a:p>
-        </p:txBody>
-      </p:sp>
-      <p:graphicFrame>
-        <p:nvGraphicFramePr>
-          <p:cNvPr id="7" name="Table 7">
-            <a:extLst>
-              <a:ext uri="{FF2B5EF4-FFF2-40B4-BE49-F238E27FC236}">
-                <a16:creationId xmlns:a16="http://schemas.microsoft.com/office/drawing/2014/main" id="{67EE4230-EB90-434B-88B4-AA62900B4E16}"/>
-              </a:ext>
-            </a:extLst>
-          </p:cNvPr>
-          <p:cNvGraphicFramePr>
-            <a:graphicFrameLocks noGrp="1"/>
-          </p:cNvGraphicFramePr>
-          <p:nvPr/>
-        </p:nvGraphicFramePr>
-        <p:xfrm>
-          <a:off x="7362825" y="1347549"/>
-          <a:ext cx="3333750" cy="3566160"/>
-        </p:xfrm>
-        <a:graphic>
-          <a:graphicData uri="http://schemas.openxmlformats.org/drawingml/2006/table">
-            <a:tbl>
-              <a:tblPr firstRow="1" bandRow="1">
-                <a:tableStyleId>{69CF1AB2-1976-4502-BF36-3FF5EA218861}</a:tableStyleId>
-              </a:tblPr>
-              <a:tblGrid>
-                <a:gridCol w="1562100">
-                  <a:extLst>
-                    <a:ext uri="{9D8B030D-6E8A-4147-A177-3AD203B41FA5}">
-                      <a16:colId xmlns:a16="http://schemas.microsoft.com/office/drawing/2014/main" val="4256267630"/>
-                    </a:ext>
-                  </a:extLst>
-                </a:gridCol>
-                <a:gridCol w="407146">
-                  <a:extLst>
-                    <a:ext uri="{9D8B030D-6E8A-4147-A177-3AD203B41FA5}">
-                      <a16:colId xmlns:a16="http://schemas.microsoft.com/office/drawing/2014/main" val="2261937681"/>
-                    </a:ext>
-                  </a:extLst>
-                </a:gridCol>
-                <a:gridCol w="626415">
-                  <a:extLst>
-                    <a:ext uri="{9D8B030D-6E8A-4147-A177-3AD203B41FA5}">
-                      <a16:colId xmlns:a16="http://schemas.microsoft.com/office/drawing/2014/main" val="1322094859"/>
-                    </a:ext>
-                  </a:extLst>
-                </a:gridCol>
-                <a:gridCol w="738089">
-                  <a:extLst>
-                    <a:ext uri="{9D8B030D-6E8A-4147-A177-3AD203B41FA5}">
-                      <a16:colId xmlns:a16="http://schemas.microsoft.com/office/drawing/2014/main" val="3153775163"/>
-                    </a:ext>
-                  </a:extLst>
-                </a:gridCol>
-              </a:tblGrid>
-              <a:tr h="246282">
-                <a:tc gridSpan="4">
-                  <a:txBody>
-                    <a:bodyPr/>
-                    <a:lstStyle/>
-                    <a:p>
-                      <a:pPr algn="ctr"/>
-                      <a:r>
-                        <a:rPr lang="en-US" sz="1200" dirty="0"/>
-                        <a:t>Some Example Lakes</a:t>
-                      </a:r>
-                    </a:p>
-                  </a:txBody>
-                  <a:tcPr/>
-                </a:tc>
-                <a:tc hMerge="1">
-                  <a:txBody>
-                    <a:bodyPr/>
-                    <a:lstStyle/>
-                    <a:p>
-                      <a:endParaRPr lang="en-US" sz="1200" dirty="0"/>
-                    </a:p>
-                  </a:txBody>
-                  <a:tcPr/>
-                </a:tc>
-                <a:tc hMerge="1">
-                  <a:txBody>
-                    <a:bodyPr/>
-                    <a:lstStyle/>
-                    <a:p>
-                      <a:endParaRPr lang="en-US" sz="1200" dirty="0"/>
-                    </a:p>
-                  </a:txBody>
-                  <a:tcPr/>
-                </a:tc>
-                <a:tc hMerge="1">
-                  <a:txBody>
-                    <a:bodyPr/>
-                    <a:lstStyle/>
-                    <a:p>
-                      <a:endParaRPr lang="en-US" sz="1200" dirty="0"/>
-                    </a:p>
-                  </a:txBody>
-                  <a:tcPr/>
-                </a:tc>
-                <a:extLst>
-                  <a:ext uri="{0D108BD9-81ED-4DB2-BD59-A6C34878D82A}">
-                    <a16:rowId xmlns:a16="http://schemas.microsoft.com/office/drawing/2014/main" val="2736464221"/>
-                  </a:ext>
-                </a:extLst>
-              </a:tr>
-              <a:tr h="246282">
-                <a:tc>
-                  <a:txBody>
-                    <a:bodyPr/>
-                    <a:lstStyle/>
-                    <a:p>
-                      <a:r>
-                        <a:rPr lang="en-US" sz="1200" b="1" dirty="0"/>
-                        <a:t>Lake</a:t>
-                      </a:r>
-                    </a:p>
-                  </a:txBody>
-                  <a:tcPr/>
-                </a:tc>
-                <a:tc>
-                  <a:txBody>
-                    <a:bodyPr/>
-                    <a:lstStyle/>
-                    <a:p>
-                      <a:r>
-                        <a:rPr lang="en-US" sz="1200" b="1" dirty="0"/>
-                        <a:t>N</a:t>
-                      </a:r>
-                    </a:p>
-                  </a:txBody>
-                  <a:tcPr/>
-                </a:tc>
-                <a:tc>
-                  <a:txBody>
-                    <a:bodyPr/>
-                    <a:lstStyle/>
-                    <a:p>
-                      <a:r>
-                        <a:rPr lang="en-US" sz="1200" b="1" dirty="0"/>
-                        <a:t>Mean</a:t>
-                      </a:r>
-                    </a:p>
-                  </a:txBody>
-                  <a:tcPr/>
-                </a:tc>
-                <a:tc>
-                  <a:txBody>
-                    <a:bodyPr/>
-                    <a:lstStyle/>
-                    <a:p>
-                      <a:r>
-                        <a:rPr lang="en-US" sz="1200" b="1" dirty="0"/>
-                        <a:t>St. Dev.</a:t>
-                      </a:r>
-                    </a:p>
-                  </a:txBody>
-                  <a:tcPr/>
-                </a:tc>
-                <a:extLst>
-                  <a:ext uri="{0D108BD9-81ED-4DB2-BD59-A6C34878D82A}">
-                    <a16:rowId xmlns:a16="http://schemas.microsoft.com/office/drawing/2014/main" val="2248649451"/>
-                  </a:ext>
-                </a:extLst>
-              </a:tr>
-              <a:tr h="246282">
-                <a:tc>
-                  <a:txBody>
-                    <a:bodyPr/>
-                    <a:lstStyle/>
-                    <a:p>
-                      <a:r>
-                        <a:rPr lang="en-US" sz="1200" dirty="0"/>
-                        <a:t>CARMI</a:t>
-                      </a:r>
-                    </a:p>
-                  </a:txBody>
-                  <a:tcPr/>
-                </a:tc>
-                <a:tc>
-                  <a:txBody>
-                    <a:bodyPr/>
-                    <a:lstStyle/>
-                    <a:p>
-                      <a:r>
-                        <a:rPr lang="en-US" sz="1200" dirty="0"/>
-                        <a:t>37</a:t>
-                      </a:r>
-                    </a:p>
-                  </a:txBody>
-                  <a:tcPr/>
-                </a:tc>
-                <a:tc>
-                  <a:txBody>
-                    <a:bodyPr/>
-                    <a:lstStyle/>
-                    <a:p>
-                      <a:r>
-                        <a:rPr lang="en-US" sz="1200" dirty="0"/>
-                        <a:t>30.9</a:t>
-                      </a:r>
-                    </a:p>
-                  </a:txBody>
-                  <a:tcPr/>
-                </a:tc>
-                <a:tc>
-                  <a:txBody>
-                    <a:bodyPr/>
-                    <a:lstStyle/>
-                    <a:p>
-                      <a:r>
-                        <a:rPr lang="en-US" sz="1200" dirty="0"/>
-                        <a:t>5.53</a:t>
-                      </a:r>
-                    </a:p>
-                  </a:txBody>
-                  <a:tcPr/>
-                </a:tc>
-                <a:extLst>
-                  <a:ext uri="{0D108BD9-81ED-4DB2-BD59-A6C34878D82A}">
-                    <a16:rowId xmlns:a16="http://schemas.microsoft.com/office/drawing/2014/main" val="94452239"/>
-                  </a:ext>
-                </a:extLst>
-              </a:tr>
-              <a:tr h="246282">
-                <a:tc>
-                  <a:txBody>
-                    <a:bodyPr/>
-                    <a:lstStyle/>
-                    <a:p>
-                      <a:pPr marL="0" marR="0" lvl="0" indent="0" algn="l" defTabSz="914400" rtl="0" eaLnBrk="1" fontAlgn="auto" latinLnBrk="0" hangingPunct="1">
-                        <a:lnSpc>
-                          <a:spcPct val="100000"/>
-                        </a:lnSpc>
-                        <a:spcBef>
-                          <a:spcPts val="0"/>
-                        </a:spcBef>
-                        <a:spcAft>
-                          <a:spcPts val="0"/>
-                        </a:spcAft>
-                        <a:buClrTx/>
-                        <a:buSzTx/>
-                        <a:buFontTx/>
-                        <a:buNone/>
-                        <a:tabLst/>
-                        <a:defRPr/>
-                      </a:pPr>
-                      <a:r>
-                        <a:rPr lang="en-US" sz="1200" dirty="0"/>
-                        <a:t>CASPIAN</a:t>
-                      </a:r>
-                    </a:p>
-                  </a:txBody>
-                  <a:tcPr/>
-                </a:tc>
-                <a:tc>
-                  <a:txBody>
-                    <a:bodyPr/>
-                    <a:lstStyle/>
-                    <a:p>
-                      <a:r>
-                        <a:rPr lang="en-US" sz="1200" dirty="0"/>
-                        <a:t>26</a:t>
-                      </a:r>
-                    </a:p>
-                  </a:txBody>
-                  <a:tcPr/>
-                </a:tc>
-                <a:tc>
-                  <a:txBody>
-                    <a:bodyPr/>
-                    <a:lstStyle/>
-                    <a:p>
-                      <a:r>
-                        <a:rPr lang="en-US" sz="1200" dirty="0"/>
-                        <a:t>9.3</a:t>
-                      </a:r>
-                    </a:p>
-                  </a:txBody>
-                  <a:tcPr/>
-                </a:tc>
-                <a:tc>
-                  <a:txBody>
-                    <a:bodyPr/>
-                    <a:lstStyle/>
-                    <a:p>
-                      <a:r>
-                        <a:rPr lang="en-US" sz="1200" dirty="0"/>
-                        <a:t>1.82</a:t>
-                      </a:r>
-                    </a:p>
-                  </a:txBody>
-                  <a:tcPr/>
-                </a:tc>
-                <a:extLst>
-                  <a:ext uri="{0D108BD9-81ED-4DB2-BD59-A6C34878D82A}">
-                    <a16:rowId xmlns:a16="http://schemas.microsoft.com/office/drawing/2014/main" val="3752780288"/>
-                  </a:ext>
-                </a:extLst>
-              </a:tr>
-              <a:tr h="246282">
-                <a:tc>
-                  <a:txBody>
-                    <a:bodyPr/>
-                    <a:lstStyle/>
-                    <a:p>
-                      <a:r>
-                        <a:rPr lang="en-US" sz="1200" dirty="0"/>
-                        <a:t>CURTIS</a:t>
-                      </a:r>
-                    </a:p>
-                  </a:txBody>
-                  <a:tcPr/>
-                </a:tc>
-                <a:tc>
-                  <a:txBody>
-                    <a:bodyPr/>
-                    <a:lstStyle/>
-                    <a:p>
-                      <a:r>
-                        <a:rPr lang="en-US" sz="1200" dirty="0"/>
-                        <a:t>25</a:t>
-                      </a:r>
-                    </a:p>
-                  </a:txBody>
-                  <a:tcPr/>
-                </a:tc>
-                <a:tc>
-                  <a:txBody>
-                    <a:bodyPr/>
-                    <a:lstStyle/>
-                    <a:p>
-                      <a:r>
-                        <a:rPr lang="en-US" sz="1200" dirty="0"/>
-                        <a:t>18.1</a:t>
-                      </a:r>
-                    </a:p>
-                  </a:txBody>
-                  <a:tcPr/>
-                </a:tc>
-                <a:tc>
-                  <a:txBody>
-                    <a:bodyPr/>
-                    <a:lstStyle/>
-                    <a:p>
-                      <a:r>
-                        <a:rPr lang="en-US" sz="1200" dirty="0"/>
-                        <a:t>3.58</a:t>
-                      </a:r>
-                    </a:p>
-                  </a:txBody>
-                  <a:tcPr/>
-                </a:tc>
-                <a:extLst>
-                  <a:ext uri="{0D108BD9-81ED-4DB2-BD59-A6C34878D82A}">
-                    <a16:rowId xmlns:a16="http://schemas.microsoft.com/office/drawing/2014/main" val="2753738978"/>
-                  </a:ext>
-                </a:extLst>
-              </a:tr>
-              <a:tr h="246282">
-                <a:tc>
-                  <a:txBody>
-                    <a:bodyPr/>
-                    <a:lstStyle/>
-                    <a:p>
-                      <a:r>
-                        <a:rPr lang="en-US" sz="1200" dirty="0"/>
-                        <a:t>DUNMORE</a:t>
-                      </a:r>
-                    </a:p>
-                  </a:txBody>
-                  <a:tcPr/>
-                </a:tc>
-                <a:tc>
-                  <a:txBody>
-                    <a:bodyPr/>
-                    <a:lstStyle/>
-                    <a:p>
-                      <a:r>
-                        <a:rPr lang="en-US" sz="1200" dirty="0"/>
-                        <a:t>23</a:t>
-                      </a:r>
-                    </a:p>
-                  </a:txBody>
-                  <a:tcPr/>
-                </a:tc>
-                <a:tc>
-                  <a:txBody>
-                    <a:bodyPr/>
-                    <a:lstStyle/>
-                    <a:p>
-                      <a:r>
-                        <a:rPr lang="en-US" sz="1200" dirty="0"/>
-                        <a:t>12.8</a:t>
-                      </a:r>
-                    </a:p>
-                  </a:txBody>
-                  <a:tcPr/>
-                </a:tc>
-                <a:tc>
-                  <a:txBody>
-                    <a:bodyPr/>
-                    <a:lstStyle/>
-                    <a:p>
-                      <a:r>
-                        <a:rPr lang="en-US" sz="1200" dirty="0"/>
-                        <a:t>2.73</a:t>
-                      </a:r>
-                    </a:p>
-                  </a:txBody>
-                  <a:tcPr/>
-                </a:tc>
-                <a:extLst>
-                  <a:ext uri="{0D108BD9-81ED-4DB2-BD59-A6C34878D82A}">
-                    <a16:rowId xmlns:a16="http://schemas.microsoft.com/office/drawing/2014/main" val="750290730"/>
-                  </a:ext>
-                </a:extLst>
-              </a:tr>
-              <a:tr h="246282">
-                <a:tc>
-                  <a:txBody>
-                    <a:bodyPr/>
-                    <a:lstStyle/>
-                    <a:p>
-                      <a:r>
-                        <a:rPr lang="en-US" sz="1200" dirty="0"/>
-                        <a:t>JOES (DANVLL)</a:t>
-                      </a:r>
-                    </a:p>
-                  </a:txBody>
-                  <a:tcPr/>
-                </a:tc>
-                <a:tc>
-                  <a:txBody>
-                    <a:bodyPr/>
-                    <a:lstStyle/>
-                    <a:p>
-                      <a:r>
-                        <a:rPr lang="en-US" sz="1200" dirty="0"/>
-                        <a:t>14</a:t>
-                      </a:r>
-                    </a:p>
-                  </a:txBody>
-                  <a:tcPr/>
-                </a:tc>
-                <a:tc>
-                  <a:txBody>
-                    <a:bodyPr/>
-                    <a:lstStyle/>
-                    <a:p>
-                      <a:r>
-                        <a:rPr lang="en-US" sz="1200" dirty="0"/>
-                        <a:t>20.2</a:t>
-                      </a:r>
-                    </a:p>
-                  </a:txBody>
-                  <a:tcPr/>
-                </a:tc>
-                <a:tc>
-                  <a:txBody>
-                    <a:bodyPr/>
-                    <a:lstStyle/>
-                    <a:p>
-                      <a:r>
-                        <a:rPr lang="en-US" sz="1200" dirty="0"/>
-                        <a:t>7.24</a:t>
-                      </a:r>
-                    </a:p>
-                  </a:txBody>
-                  <a:tcPr/>
-                </a:tc>
-                <a:extLst>
-                  <a:ext uri="{0D108BD9-81ED-4DB2-BD59-A6C34878D82A}">
-                    <a16:rowId xmlns:a16="http://schemas.microsoft.com/office/drawing/2014/main" val="3939792130"/>
-                  </a:ext>
-                </a:extLst>
-              </a:tr>
-              <a:tr h="246282">
-                <a:tc>
-                  <a:txBody>
-                    <a:bodyPr/>
-                    <a:lstStyle/>
-                    <a:p>
-                      <a:r>
-                        <a:rPr lang="en-US" sz="1200" dirty="0"/>
-                        <a:t>MAIDSTONE</a:t>
-                      </a:r>
-                    </a:p>
-                  </a:txBody>
-                  <a:tcPr/>
-                </a:tc>
-                <a:tc>
-                  <a:txBody>
-                    <a:bodyPr/>
-                    <a:lstStyle/>
-                    <a:p>
-                      <a:r>
-                        <a:rPr lang="en-US" sz="1200" dirty="0"/>
-                        <a:t>26</a:t>
-                      </a:r>
-                    </a:p>
-                  </a:txBody>
-                  <a:tcPr/>
-                </a:tc>
-                <a:tc>
-                  <a:txBody>
-                    <a:bodyPr/>
-                    <a:lstStyle/>
-                    <a:p>
-                      <a:r>
-                        <a:rPr lang="en-US" sz="1200" dirty="0"/>
-                        <a:t>6.8</a:t>
-                      </a:r>
-                    </a:p>
-                  </a:txBody>
-                  <a:tcPr/>
-                </a:tc>
-                <a:tc>
-                  <a:txBody>
-                    <a:bodyPr/>
-                    <a:lstStyle/>
-                    <a:p>
-                      <a:r>
-                        <a:rPr lang="en-US" sz="1200" dirty="0"/>
-                        <a:t>1.09</a:t>
-                      </a:r>
-                    </a:p>
-                  </a:txBody>
-                  <a:tcPr/>
-                </a:tc>
-                <a:extLst>
-                  <a:ext uri="{0D108BD9-81ED-4DB2-BD59-A6C34878D82A}">
-                    <a16:rowId xmlns:a16="http://schemas.microsoft.com/office/drawing/2014/main" val="3200487020"/>
-                  </a:ext>
-                </a:extLst>
-              </a:tr>
-              <a:tr h="246282">
-                <a:tc>
-                  <a:txBody>
-                    <a:bodyPr/>
-                    <a:lstStyle/>
-                    <a:p>
-                      <a:r>
-                        <a:rPr lang="en-US" sz="1200" dirty="0"/>
-                        <a:t>MEMPHREMAGOG</a:t>
-                      </a:r>
-                    </a:p>
-                  </a:txBody>
-                  <a:tcPr/>
-                </a:tc>
-                <a:tc>
-                  <a:txBody>
-                    <a:bodyPr/>
-                    <a:lstStyle/>
-                    <a:p>
-                      <a:r>
-                        <a:rPr lang="en-US" sz="1200" dirty="0"/>
-                        <a:t>27</a:t>
-                      </a:r>
-                    </a:p>
-                  </a:txBody>
-                  <a:tcPr/>
-                </a:tc>
-                <a:tc>
-                  <a:txBody>
-                    <a:bodyPr/>
-                    <a:lstStyle/>
-                    <a:p>
-                      <a:r>
-                        <a:rPr lang="en-US" sz="1200" dirty="0"/>
-                        <a:t>19.3</a:t>
-                      </a:r>
-                    </a:p>
-                  </a:txBody>
-                  <a:tcPr/>
-                </a:tc>
-                <a:tc>
-                  <a:txBody>
-                    <a:bodyPr/>
-                    <a:lstStyle/>
-                    <a:p>
-                      <a:r>
-                        <a:rPr lang="en-US" sz="1200" dirty="0"/>
-                        <a:t>3.13</a:t>
-                      </a:r>
-                    </a:p>
-                  </a:txBody>
-                  <a:tcPr/>
-                </a:tc>
-                <a:extLst>
-                  <a:ext uri="{0D108BD9-81ED-4DB2-BD59-A6C34878D82A}">
-                    <a16:rowId xmlns:a16="http://schemas.microsoft.com/office/drawing/2014/main" val="31395098"/>
-                  </a:ext>
-                </a:extLst>
-              </a:tr>
-              <a:tr h="246282">
-                <a:tc>
-                  <a:txBody>
-                    <a:bodyPr/>
-                    <a:lstStyle/>
-                    <a:p>
-                      <a:r>
-                        <a:rPr lang="en-US" sz="1200" dirty="0"/>
-                        <a:t>RAPONDA</a:t>
-                      </a:r>
-                    </a:p>
-                  </a:txBody>
-                  <a:tcPr/>
-                </a:tc>
-                <a:tc>
-                  <a:txBody>
-                    <a:bodyPr/>
-                    <a:lstStyle/>
-                    <a:p>
-                      <a:r>
-                        <a:rPr lang="en-US" sz="1200" dirty="0"/>
-                        <a:t>18</a:t>
-                      </a:r>
-                    </a:p>
-                  </a:txBody>
-                  <a:tcPr/>
-                </a:tc>
-                <a:tc>
-                  <a:txBody>
-                    <a:bodyPr/>
-                    <a:lstStyle/>
-                    <a:p>
-                      <a:r>
-                        <a:rPr lang="en-US" sz="1200" dirty="0"/>
-                        <a:t>11.4</a:t>
-                      </a:r>
-                    </a:p>
-                  </a:txBody>
-                  <a:tcPr/>
-                </a:tc>
-                <a:tc>
-                  <a:txBody>
-                    <a:bodyPr/>
-                    <a:lstStyle/>
-                    <a:p>
-                      <a:r>
-                        <a:rPr lang="en-US" sz="1200" dirty="0"/>
-                        <a:t>2.00</a:t>
-                      </a:r>
-                    </a:p>
-                  </a:txBody>
-                  <a:tcPr/>
-                </a:tc>
-                <a:extLst>
-                  <a:ext uri="{0D108BD9-81ED-4DB2-BD59-A6C34878D82A}">
-                    <a16:rowId xmlns:a16="http://schemas.microsoft.com/office/drawing/2014/main" val="130211755"/>
-                  </a:ext>
-                </a:extLst>
-              </a:tr>
-              <a:tr h="246282">
-                <a:tc>
-                  <a:txBody>
-                    <a:bodyPr/>
-                    <a:lstStyle/>
-                    <a:p>
-                      <a:r>
-                        <a:rPr lang="en-US" sz="1200" dirty="0"/>
-                        <a:t>SEYMOUR</a:t>
-                      </a:r>
-                    </a:p>
-                  </a:txBody>
-                  <a:tcPr/>
-                </a:tc>
-                <a:tc>
-                  <a:txBody>
-                    <a:bodyPr/>
-                    <a:lstStyle/>
-                    <a:p>
-                      <a:r>
-                        <a:rPr lang="en-US" sz="1200" dirty="0"/>
-                        <a:t>23</a:t>
-                      </a:r>
-                    </a:p>
-                  </a:txBody>
-                  <a:tcPr/>
-                </a:tc>
-                <a:tc>
-                  <a:txBody>
-                    <a:bodyPr/>
-                    <a:lstStyle/>
-                    <a:p>
-                      <a:r>
-                        <a:rPr lang="en-US" sz="1200" dirty="0"/>
-                        <a:t>9.0</a:t>
-                      </a:r>
-                    </a:p>
-                  </a:txBody>
-                  <a:tcPr/>
-                </a:tc>
-                <a:tc>
-                  <a:txBody>
-                    <a:bodyPr/>
-                    <a:lstStyle/>
-                    <a:p>
-                      <a:r>
-                        <a:rPr lang="en-US" sz="1200" dirty="0"/>
-                        <a:t>2.41</a:t>
-                      </a:r>
-                    </a:p>
-                  </a:txBody>
-                  <a:tcPr/>
-                </a:tc>
-                <a:extLst>
-                  <a:ext uri="{0D108BD9-81ED-4DB2-BD59-A6C34878D82A}">
-                    <a16:rowId xmlns:a16="http://schemas.microsoft.com/office/drawing/2014/main" val="243275096"/>
-                  </a:ext>
-                </a:extLst>
-              </a:tr>
-              <a:tr h="246282">
-                <a:tc>
-                  <a:txBody>
-                    <a:bodyPr/>
-                    <a:lstStyle/>
-                    <a:p>
-                      <a:r>
-                        <a:rPr lang="en-US" sz="1200" dirty="0"/>
-                        <a:t>SHELBURNE</a:t>
-                      </a:r>
-                    </a:p>
-                  </a:txBody>
-                  <a:tcPr/>
-                </a:tc>
-                <a:tc>
-                  <a:txBody>
-                    <a:bodyPr/>
-                    <a:lstStyle/>
-                    <a:p>
-                      <a:r>
-                        <a:rPr lang="en-US" sz="1200" dirty="0"/>
-                        <a:t>6</a:t>
-                      </a:r>
-                    </a:p>
-                  </a:txBody>
-                  <a:tcPr/>
-                </a:tc>
-                <a:tc>
-                  <a:txBody>
-                    <a:bodyPr/>
-                    <a:lstStyle/>
-                    <a:p>
-                      <a:r>
-                        <a:rPr lang="en-US" sz="1200" dirty="0"/>
-                        <a:t>151.4</a:t>
-                      </a:r>
-                    </a:p>
-                  </a:txBody>
-                  <a:tcPr/>
-                </a:tc>
-                <a:tc>
-                  <a:txBody>
-                    <a:bodyPr/>
-                    <a:lstStyle/>
-                    <a:p>
-                      <a:r>
-                        <a:rPr lang="en-US" sz="1200" dirty="0"/>
-                        <a:t>38.20</a:t>
-                      </a:r>
-                    </a:p>
-                  </a:txBody>
-                  <a:tcPr/>
-                </a:tc>
-                <a:extLst>
-                  <a:ext uri="{0D108BD9-81ED-4DB2-BD59-A6C34878D82A}">
-                    <a16:rowId xmlns:a16="http://schemas.microsoft.com/office/drawing/2014/main" val="2340048807"/>
-                  </a:ext>
-                </a:extLst>
-              </a:tr>
-              <a:tr h="246282">
-                <a:tc>
-                  <a:txBody>
-                    <a:bodyPr/>
-                    <a:lstStyle/>
-                    <a:p>
-                      <a:r>
-                        <a:rPr lang="en-US" sz="1200" dirty="0"/>
-                        <a:t>WILLOUGHBY</a:t>
-                      </a:r>
-                    </a:p>
-                  </a:txBody>
-                  <a:tcPr/>
-                </a:tc>
-                <a:tc>
-                  <a:txBody>
-                    <a:bodyPr/>
-                    <a:lstStyle/>
-                    <a:p>
-                      <a:r>
-                        <a:rPr lang="en-US" sz="1200" dirty="0"/>
-                        <a:t>25</a:t>
-                      </a:r>
-                    </a:p>
-                  </a:txBody>
-                  <a:tcPr/>
-                </a:tc>
-                <a:tc>
-                  <a:txBody>
-                    <a:bodyPr/>
-                    <a:lstStyle/>
-                    <a:p>
-                      <a:r>
-                        <a:rPr lang="en-US" sz="1200" dirty="0"/>
-                        <a:t>10.5</a:t>
-                      </a:r>
-                    </a:p>
-                  </a:txBody>
-                  <a:tcPr/>
-                </a:tc>
-                <a:tc>
-                  <a:txBody>
-                    <a:bodyPr/>
-                    <a:lstStyle/>
-                    <a:p>
-                      <a:r>
-                        <a:rPr lang="en-US" sz="1200" dirty="0"/>
-                        <a:t>3.70</a:t>
-                      </a:r>
-                    </a:p>
-                  </a:txBody>
-                  <a:tcPr/>
-                </a:tc>
-                <a:extLst>
-                  <a:ext uri="{0D108BD9-81ED-4DB2-BD59-A6C34878D82A}">
-                    <a16:rowId xmlns:a16="http://schemas.microsoft.com/office/drawing/2014/main" val="2021891949"/>
-                  </a:ext>
-                </a:extLst>
-              </a:tr>
-            </a:tbl>
-          </a:graphicData>
-        </a:graphic>
-      </p:graphicFrame>
-    </p:spTree>
-    <p:extLst>
-      <p:ext uri="{BB962C8B-B14F-4D97-AF65-F5344CB8AC3E}">
-        <p14:creationId xmlns:p14="http://schemas.microsoft.com/office/powerpoint/2010/main" val="4085186478"/>
       </p:ext>
     </p:extLst>
   </p:cSld>
@@ -12365,13 +12562,7 @@
           <p:cNvGraphicFramePr>
             <a:graphicFrameLocks noGrp="1"/>
           </p:cNvGraphicFramePr>
-          <p:nvPr>
-            <p:extLst>
-              <p:ext uri="{D42A27DB-BD31-4B8C-83A1-F6EECF244321}">
-                <p14:modId xmlns:p14="http://schemas.microsoft.com/office/powerpoint/2010/main" val="244740974"/>
-              </p:ext>
-            </p:extLst>
-          </p:nvPr>
+          <p:nvPr/>
         </p:nvGraphicFramePr>
         <p:xfrm>
           <a:off x="7362825" y="1347549"/>
@@ -12965,11 +13156,7 @@
                       </a:r>
                     </a:p>
                   </a:txBody>
-                  <a:tcPr>
-                    <a:solidFill>
-                      <a:srgbClr val="C49A00"/>
-                    </a:solidFill>
-                  </a:tcPr>
+                  <a:tcPr/>
                 </a:tc>
                 <a:tc>
                   <a:txBody>
@@ -12982,11 +13169,7 @@
                       </a:r>
                     </a:p>
                   </a:txBody>
-                  <a:tcPr>
-                    <a:solidFill>
-                      <a:srgbClr val="C49A00"/>
-                    </a:solidFill>
-                  </a:tcPr>
+                  <a:tcPr/>
                 </a:tc>
                 <a:tc>
                   <a:txBody>
@@ -12999,11 +13182,7 @@
                       </a:r>
                     </a:p>
                   </a:txBody>
-                  <a:tcPr>
-                    <a:solidFill>
-                      <a:srgbClr val="C49A00"/>
-                    </a:solidFill>
-                  </a:tcPr>
+                  <a:tcPr/>
                 </a:tc>
                 <a:tc>
                   <a:txBody>
@@ -13016,11 +13195,7 @@
                       </a:r>
                     </a:p>
                   </a:txBody>
-                  <a:tcPr>
-                    <a:solidFill>
-                      <a:srgbClr val="C49A00"/>
-                    </a:solidFill>
-                  </a:tcPr>
+                  <a:tcPr/>
                 </a:tc>
                 <a:extLst>
                   <a:ext uri="{0D108BD9-81ED-4DB2-BD59-A6C34878D82A}">
@@ -13212,7 +13387,7 @@
     </p:spTree>
     <p:extLst>
       <p:ext uri="{BB962C8B-B14F-4D97-AF65-F5344CB8AC3E}">
-        <p14:creationId xmlns:p14="http://schemas.microsoft.com/office/powerpoint/2010/main" val="1333202564"/>
+        <p14:creationId xmlns:p14="http://schemas.microsoft.com/office/powerpoint/2010/main" val="4085186478"/>
       </p:ext>
     </p:extLst>
   </p:cSld>
@@ -13336,7 +13511,13 @@
           <p:cNvGraphicFramePr>
             <a:graphicFrameLocks noGrp="1"/>
           </p:cNvGraphicFramePr>
-          <p:nvPr/>
+          <p:nvPr>
+            <p:extLst>
+              <p:ext uri="{D42A27DB-BD31-4B8C-83A1-F6EECF244321}">
+                <p14:modId xmlns:p14="http://schemas.microsoft.com/office/powerpoint/2010/main" val="244740974"/>
+              </p:ext>
+            </p:extLst>
+          </p:nvPr>
         </p:nvGraphicFramePr>
         <p:xfrm>
           <a:off x="7362825" y="1347549"/>
@@ -13812,11 +13993,7 @@
                       </a:r>
                     </a:p>
                   </a:txBody>
-                  <a:tcPr>
-                    <a:solidFill>
-                      <a:srgbClr val="F8766D"/>
-                    </a:solidFill>
-                  </a:tcPr>
+                  <a:tcPr/>
                 </a:tc>
                 <a:tc>
                   <a:txBody>
@@ -13829,11 +14006,7 @@
                       </a:r>
                     </a:p>
                   </a:txBody>
-                  <a:tcPr>
-                    <a:solidFill>
-                      <a:srgbClr val="F8766D"/>
-                    </a:solidFill>
-                  </a:tcPr>
+                  <a:tcPr/>
                 </a:tc>
                 <a:tc>
                   <a:txBody>
@@ -13846,11 +14019,7 @@
                       </a:r>
                     </a:p>
                   </a:txBody>
-                  <a:tcPr>
-                    <a:solidFill>
-                      <a:srgbClr val="F8766D"/>
-                    </a:solidFill>
-                  </a:tcPr>
+                  <a:tcPr/>
                 </a:tc>
                 <a:tc>
                   <a:txBody>
@@ -13863,11 +14032,7 @@
                       </a:r>
                     </a:p>
                   </a:txBody>
-                  <a:tcPr>
-                    <a:solidFill>
-                      <a:srgbClr val="F8766D"/>
-                    </a:solidFill>
-                  </a:tcPr>
+                  <a:tcPr/>
                 </a:tc>
                 <a:extLst>
                   <a:ext uri="{0D108BD9-81ED-4DB2-BD59-A6C34878D82A}">
@@ -13946,7 +14111,11 @@
                       </a:r>
                     </a:p>
                   </a:txBody>
-                  <a:tcPr/>
+                  <a:tcPr>
+                    <a:solidFill>
+                      <a:srgbClr val="C49A00"/>
+                    </a:solidFill>
+                  </a:tcPr>
                 </a:tc>
                 <a:tc>
                   <a:txBody>
@@ -13959,7 +14128,11 @@
                       </a:r>
                     </a:p>
                   </a:txBody>
-                  <a:tcPr/>
+                  <a:tcPr>
+                    <a:solidFill>
+                      <a:srgbClr val="C49A00"/>
+                    </a:solidFill>
+                  </a:tcPr>
                 </a:tc>
                 <a:tc>
                   <a:txBody>
@@ -13972,7 +14145,11 @@
                       </a:r>
                     </a:p>
                   </a:txBody>
-                  <a:tcPr/>
+                  <a:tcPr>
+                    <a:solidFill>
+                      <a:srgbClr val="C49A00"/>
+                    </a:solidFill>
+                  </a:tcPr>
                 </a:tc>
                 <a:tc>
                   <a:txBody>
@@ -13985,7 +14162,11 @@
                       </a:r>
                     </a:p>
                   </a:txBody>
-                  <a:tcPr/>
+                  <a:tcPr>
+                    <a:solidFill>
+                      <a:srgbClr val="C49A00"/>
+                    </a:solidFill>
+                  </a:tcPr>
                 </a:tc>
                 <a:extLst>
                   <a:ext uri="{0D108BD9-81ED-4DB2-BD59-A6C34878D82A}">
@@ -14174,52 +14355,10 @@
           </a:graphicData>
         </a:graphic>
       </p:graphicFrame>
-      <p:cxnSp>
-        <p:nvCxnSpPr>
-          <p:cNvPr id="4" name="Straight Connector 3">
-            <a:extLst>
-              <a:ext uri="{FF2B5EF4-FFF2-40B4-BE49-F238E27FC236}">
-                <a16:creationId xmlns:a16="http://schemas.microsoft.com/office/drawing/2014/main" id="{C4E4FE7E-A2A4-46ED-99FC-AD892FF8C7DA}"/>
-              </a:ext>
-            </a:extLst>
-          </p:cNvPr>
-          <p:cNvCxnSpPr/>
-          <p:nvPr/>
-        </p:nvCxnSpPr>
-        <p:spPr>
-          <a:xfrm>
-            <a:off x="790575" y="5724525"/>
-            <a:ext cx="9906000" cy="0"/>
-          </a:xfrm>
-          <a:prstGeom prst="line">
-            <a:avLst/>
-          </a:prstGeom>
-          <a:ln w="19050">
-            <a:solidFill>
-              <a:schemeClr val="tx1"/>
-            </a:solidFill>
-            <a:prstDash val="sysDash"/>
-          </a:ln>
-        </p:spPr>
-        <p:style>
-          <a:lnRef idx="1">
-            <a:schemeClr val="accent1"/>
-          </a:lnRef>
-          <a:fillRef idx="0">
-            <a:schemeClr val="accent1"/>
-          </a:fillRef>
-          <a:effectRef idx="0">
-            <a:schemeClr val="accent1"/>
-          </a:effectRef>
-          <a:fontRef idx="minor">
-            <a:schemeClr val="tx1"/>
-          </a:fontRef>
-        </p:style>
-      </p:cxnSp>
     </p:spTree>
     <p:extLst>
       <p:ext uri="{BB962C8B-B14F-4D97-AF65-F5344CB8AC3E}">
-        <p14:creationId xmlns:p14="http://schemas.microsoft.com/office/powerpoint/2010/main" val="736114940"/>
+        <p14:creationId xmlns:p14="http://schemas.microsoft.com/office/powerpoint/2010/main" val="1333202564"/>
       </p:ext>
     </p:extLst>
   </p:cSld>

</xml_diff>